<commit_message>
Updates to Financial Module
git-svn-id: http://gforge.hl7.org/svn/fhir/trunk/build@10467 2f0db536-2c49-4257-a3fa-e771ed206c19
</commit_message>
<xml_diff>
--- a/images/source/financial-module-resources.pptx
+++ b/images/source/financial-module-resources.pptx
@@ -109,7 +109,7 @@
   </p:defaultTextStyle>
   <p:extLst>
     <p:ext uri="{EFAFB233-063F-42B5-8137-9DF3F51BA10A}">
-      <p15:sldGuideLst xmlns:p15="http://schemas.microsoft.com/office/powerpoint/2012/main"/>
+      <p15:sldGuideLst xmlns="" xmlns:p15="http://schemas.microsoft.com/office/powerpoint/2012/main"/>
     </p:ext>
   </p:extLst>
 </p:presentation>
@@ -244,7 +244,7 @@
           <a:p>
             <a:fld id="{DE4E7392-00FF-4A5B-A4FB-CA939482D6BD}" type="datetimeFigureOut">
               <a:rPr lang="en-US" smtClean="0"/>
-              <a:t>11/30/2016</a:t>
+              <a:t>12/4/2016</a:t>
             </a:fld>
             <a:endParaRPr lang="en-US"/>
           </a:p>
@@ -412,7 +412,7 @@
           <a:p>
             <a:fld id="{DE4E7392-00FF-4A5B-A4FB-CA939482D6BD}" type="datetimeFigureOut">
               <a:rPr lang="en-US" smtClean="0"/>
-              <a:t>11/30/2016</a:t>
+              <a:t>12/4/2016</a:t>
             </a:fld>
             <a:endParaRPr lang="en-US"/>
           </a:p>
@@ -590,7 +590,7 @@
           <a:p>
             <a:fld id="{DE4E7392-00FF-4A5B-A4FB-CA939482D6BD}" type="datetimeFigureOut">
               <a:rPr lang="en-US" smtClean="0"/>
-              <a:t>11/30/2016</a:t>
+              <a:t>12/4/2016</a:t>
             </a:fld>
             <a:endParaRPr lang="en-US"/>
           </a:p>
@@ -758,7 +758,7 @@
           <a:p>
             <a:fld id="{DE4E7392-00FF-4A5B-A4FB-CA939482D6BD}" type="datetimeFigureOut">
               <a:rPr lang="en-US" smtClean="0"/>
-              <a:t>11/30/2016</a:t>
+              <a:t>12/4/2016</a:t>
             </a:fld>
             <a:endParaRPr lang="en-US"/>
           </a:p>
@@ -1003,7 +1003,7 @@
           <a:p>
             <a:fld id="{DE4E7392-00FF-4A5B-A4FB-CA939482D6BD}" type="datetimeFigureOut">
               <a:rPr lang="en-US" smtClean="0"/>
-              <a:t>11/30/2016</a:t>
+              <a:t>12/4/2016</a:t>
             </a:fld>
             <a:endParaRPr lang="en-US"/>
           </a:p>
@@ -1232,7 +1232,7 @@
           <a:p>
             <a:fld id="{DE4E7392-00FF-4A5B-A4FB-CA939482D6BD}" type="datetimeFigureOut">
               <a:rPr lang="en-US" smtClean="0"/>
-              <a:t>11/30/2016</a:t>
+              <a:t>12/4/2016</a:t>
             </a:fld>
             <a:endParaRPr lang="en-US"/>
           </a:p>
@@ -1596,7 +1596,7 @@
           <a:p>
             <a:fld id="{DE4E7392-00FF-4A5B-A4FB-CA939482D6BD}" type="datetimeFigureOut">
               <a:rPr lang="en-US" smtClean="0"/>
-              <a:t>11/30/2016</a:t>
+              <a:t>12/4/2016</a:t>
             </a:fld>
             <a:endParaRPr lang="en-US"/>
           </a:p>
@@ -1713,7 +1713,7 @@
           <a:p>
             <a:fld id="{DE4E7392-00FF-4A5B-A4FB-CA939482D6BD}" type="datetimeFigureOut">
               <a:rPr lang="en-US" smtClean="0"/>
-              <a:t>11/30/2016</a:t>
+              <a:t>12/4/2016</a:t>
             </a:fld>
             <a:endParaRPr lang="en-US"/>
           </a:p>
@@ -1808,7 +1808,7 @@
           <a:p>
             <a:fld id="{DE4E7392-00FF-4A5B-A4FB-CA939482D6BD}" type="datetimeFigureOut">
               <a:rPr lang="en-US" smtClean="0"/>
-              <a:t>11/30/2016</a:t>
+              <a:t>12/4/2016</a:t>
             </a:fld>
             <a:endParaRPr lang="en-US"/>
           </a:p>
@@ -2083,7 +2083,7 @@
           <a:p>
             <a:fld id="{DE4E7392-00FF-4A5B-A4FB-CA939482D6BD}" type="datetimeFigureOut">
               <a:rPr lang="en-US" smtClean="0"/>
-              <a:t>11/30/2016</a:t>
+              <a:t>12/4/2016</a:t>
             </a:fld>
             <a:endParaRPr lang="en-US"/>
           </a:p>
@@ -2335,7 +2335,7 @@
           <a:p>
             <a:fld id="{DE4E7392-00FF-4A5B-A4FB-CA939482D6BD}" type="datetimeFigureOut">
               <a:rPr lang="en-US" smtClean="0"/>
-              <a:t>11/30/2016</a:t>
+              <a:t>12/4/2016</a:t>
             </a:fld>
             <a:endParaRPr lang="en-US"/>
           </a:p>
@@ -2546,7 +2546,7 @@
           <a:p>
             <a:fld id="{DE4E7392-00FF-4A5B-A4FB-CA939482D6BD}" type="datetimeFigureOut">
               <a:rPr lang="en-US" smtClean="0"/>
-              <a:t>11/30/2016</a:t>
+              <a:t>12/4/2016</a:t>
             </a:fld>
             <a:endParaRPr lang="en-US"/>
           </a:p>
@@ -3585,7 +3585,7 @@
         </p:nvSpPr>
         <p:spPr>
           <a:xfrm>
-            <a:off x="3510547" y="3313245"/>
+            <a:off x="3510547" y="3133637"/>
             <a:ext cx="651717" cy="338554"/>
           </a:xfrm>
           <a:prstGeom prst="rect">
@@ -3614,7 +3614,7 @@
         </p:nvSpPr>
         <p:spPr>
           <a:xfrm>
-            <a:off x="4690123" y="3342641"/>
+            <a:off x="4690123" y="3130377"/>
             <a:ext cx="1060483" cy="338554"/>
           </a:xfrm>
           <a:prstGeom prst="rect">
@@ -4413,6 +4413,70 @@
           </a:fontRef>
         </p:style>
       </p:cxnSp>
+      <p:sp>
+        <p:nvSpPr>
+          <p:cNvPr id="33" name="TextBox 32"/>
+          <p:cNvSpPr txBox="1"/>
+          <p:nvPr/>
+        </p:nvSpPr>
+        <p:spPr>
+          <a:xfrm>
+            <a:off x="3053363" y="3378557"/>
+            <a:ext cx="1113638" cy="338554"/>
+          </a:xfrm>
+          <a:prstGeom prst="rect">
+            <a:avLst/>
+          </a:prstGeom>
+          <a:noFill/>
+        </p:spPr>
+        <p:txBody>
+          <a:bodyPr wrap="none" rtlCol="0">
+            <a:spAutoFit/>
+          </a:bodyPr>
+          <a:lstStyle/>
+          <a:p>
+            <a:r>
+              <a:rPr lang="en-US" sz="1600" dirty="0" smtClean="0"/>
+              <a:t>Beneficiary</a:t>
+            </a:r>
+            <a:endParaRPr lang="en-US" sz="1600" dirty="0"/>
+          </a:p>
+        </p:txBody>
+      </p:sp>
+      <p:sp>
+        <p:nvSpPr>
+          <p:cNvPr id="34" name="TextBox 33"/>
+          <p:cNvSpPr txBox="1"/>
+          <p:nvPr/>
+        </p:nvSpPr>
+        <p:spPr>
+          <a:xfrm>
+            <a:off x="4681959" y="3375297"/>
+            <a:ext cx="1107996" cy="338554"/>
+          </a:xfrm>
+          <a:prstGeom prst="rect">
+            <a:avLst/>
+          </a:prstGeom>
+          <a:noFill/>
+        </p:spPr>
+        <p:txBody>
+          <a:bodyPr wrap="none" rtlCol="0">
+            <a:spAutoFit/>
+          </a:bodyPr>
+          <a:lstStyle/>
+          <a:p>
+            <a:r>
+              <a:rPr lang="en-US" sz="1600" dirty="0" err="1" smtClean="0"/>
+              <a:t>PlanHold</a:t>
+            </a:r>
+            <a:r>
+              <a:rPr lang="en-US" sz="1600" dirty="0" err="1" smtClean="0"/>
+              <a:t>er</a:t>
+            </a:r>
+            <a:endParaRPr lang="en-US" sz="1600" dirty="0"/>
+          </a:p>
+        </p:txBody>
+      </p:sp>
     </p:spTree>
     <p:extLst>
       <p:ext uri="{BB962C8B-B14F-4D97-AF65-F5344CB8AC3E}">
@@ -4672,7 +4736,7 @@
         <p:spPr>
           <a:xfrm flipV="1">
             <a:off x="2160111" y="2176992"/>
-            <a:ext cx="46923" cy="1141150"/>
+            <a:ext cx="0" cy="1141150"/>
           </a:xfrm>
           <a:prstGeom prst="straightConnector1">
             <a:avLst/>
@@ -5013,7 +5077,7 @@
         </p:nvSpPr>
         <p:spPr>
           <a:xfrm>
-            <a:off x="3697686" y="2858333"/>
+            <a:off x="3697686" y="2752201"/>
             <a:ext cx="651717" cy="338554"/>
           </a:xfrm>
           <a:prstGeom prst="rect">
@@ -5042,7 +5106,7 @@
         </p:nvSpPr>
         <p:spPr>
           <a:xfrm>
-            <a:off x="4877262" y="2887729"/>
+            <a:off x="4877262" y="2765269"/>
             <a:ext cx="1060483" cy="338554"/>
           </a:xfrm>
           <a:prstGeom prst="rect">
@@ -5219,39 +5283,6 @@
           </a:p>
         </p:txBody>
       </p:sp>
-      <p:cxnSp>
-        <p:nvCxnSpPr>
-          <p:cNvPr id="110" name="Elbow Connector 37"/>
-          <p:cNvCxnSpPr/>
-          <p:nvPr/>
-        </p:nvCxnSpPr>
-        <p:spPr>
-          <a:xfrm flipV="1">
-            <a:off x="2124831" y="5376582"/>
-            <a:ext cx="0" cy="657597"/>
-          </a:xfrm>
-          <a:prstGeom prst="straightConnector1">
-            <a:avLst/>
-          </a:prstGeom>
-          <a:ln>
-            <a:tailEnd type="triangle"/>
-          </a:ln>
-        </p:spPr>
-        <p:style>
-          <a:lnRef idx="3">
-            <a:schemeClr val="dk1"/>
-          </a:lnRef>
-          <a:fillRef idx="0">
-            <a:schemeClr val="dk1"/>
-          </a:fillRef>
-          <a:effectRef idx="2">
-            <a:schemeClr val="dk1"/>
-          </a:effectRef>
-          <a:fontRef idx="minor">
-            <a:schemeClr val="tx1"/>
-          </a:fontRef>
-        </p:style>
-      </p:cxnSp>
       <p:cxnSp>
         <p:nvCxnSpPr>
           <p:cNvPr id="113" name="Elbow Connector 37"/>
@@ -5898,6 +5929,70 @@
                 <a:schemeClr val="tx1"/>
               </a:solidFill>
             </a:endParaRPr>
+          </a:p>
+        </p:txBody>
+      </p:sp>
+      <p:sp>
+        <p:nvSpPr>
+          <p:cNvPr id="32" name="TextBox 31"/>
+          <p:cNvSpPr txBox="1"/>
+          <p:nvPr/>
+        </p:nvSpPr>
+        <p:spPr>
+          <a:xfrm>
+            <a:off x="3241135" y="2986685"/>
+            <a:ext cx="1113638" cy="338554"/>
+          </a:xfrm>
+          <a:prstGeom prst="rect">
+            <a:avLst/>
+          </a:prstGeom>
+          <a:noFill/>
+        </p:spPr>
+        <p:txBody>
+          <a:bodyPr wrap="none" rtlCol="0">
+            <a:spAutoFit/>
+          </a:bodyPr>
+          <a:lstStyle/>
+          <a:p>
+            <a:r>
+              <a:rPr lang="en-US" sz="1600" dirty="0" smtClean="0"/>
+              <a:t>Beneficiary</a:t>
+            </a:r>
+            <a:endParaRPr lang="en-US" sz="1600" dirty="0"/>
+          </a:p>
+        </p:txBody>
+      </p:sp>
+      <p:sp>
+        <p:nvSpPr>
+          <p:cNvPr id="33" name="TextBox 32"/>
+          <p:cNvSpPr txBox="1"/>
+          <p:nvPr/>
+        </p:nvSpPr>
+        <p:spPr>
+          <a:xfrm>
+            <a:off x="4869731" y="2983425"/>
+            <a:ext cx="1107996" cy="338554"/>
+          </a:xfrm>
+          <a:prstGeom prst="rect">
+            <a:avLst/>
+          </a:prstGeom>
+          <a:noFill/>
+        </p:spPr>
+        <p:txBody>
+          <a:bodyPr wrap="none" rtlCol="0">
+            <a:spAutoFit/>
+          </a:bodyPr>
+          <a:lstStyle/>
+          <a:p>
+            <a:r>
+              <a:rPr lang="en-US" sz="1600" dirty="0" err="1" smtClean="0"/>
+              <a:t>PlanHold</a:t>
+            </a:r>
+            <a:r>
+              <a:rPr lang="en-US" sz="1600" dirty="0" err="1" smtClean="0"/>
+              <a:t>er</a:t>
+            </a:r>
+            <a:endParaRPr lang="en-US" sz="1600" dirty="0"/>
           </a:p>
         </p:txBody>
       </p:sp>
@@ -8924,6 +9019,14 @@
   <p:clrMapOvr>
     <a:masterClrMapping/>
   </p:clrMapOvr>
+  <mc:AlternateContent xmlns:mc="http://schemas.openxmlformats.org/markup-compatibility/2006" xmlns:p14="http://schemas.microsoft.com/office/powerpoint/2010/main">
+    <mc:Choice Requires="p14">
+      <p:transition spd="slow" p14:dur="2000"/>
+    </mc:Choice>
+    <mc:Fallback xmlns="">
+      <p:transition spd="slow"/>
+    </mc:Fallback>
+  </mc:AlternateContent>
 </p:sld>
 </file>
 
@@ -9182,7 +9285,7 @@
   <a:extraClrSchemeLst/>
   <a:extLst>
     <a:ext uri="{05A4C25C-085E-4340-85A3-A5531E510DB2}">
-      <thm15:themeFamily xmlns:thm15="http://schemas.microsoft.com/office/thememl/2012/main" name="Office Theme" id="{62F939B6-93AF-4DB8-9C6B-D6C7DFDC589F}" vid="{4A3C46E8-61CC-4603-A589-7422A47A8E4A}"/>
+      <thm15:themeFamily xmlns="" xmlns:thm15="http://schemas.microsoft.com/office/thememl/2012/main" name="Office Theme" id="{62F939B6-93AF-4DB8-9C6B-D6C7DFDC589F}" vid="{4A3C46E8-61CC-4603-A589-7422A47A8E4A}"/>
     </a:ext>
   </a:extLst>
 </a:theme>

</xml_diff>

<commit_message>
FHIR c ode updates
</commit_message>
<xml_diff>
--- a/images/source/financial-module-resources.pptx
+++ b/images/source/financial-module-resources.pptx
@@ -9,6 +9,7 @@
     <p:sldId id="262" r:id="rId3"/>
     <p:sldId id="261" r:id="rId4"/>
     <p:sldId id="258" r:id="rId5"/>
+    <p:sldId id="263" r:id="rId6"/>
   </p:sldIdLst>
   <p:sldSz cx="12192000" cy="6858000"/>
   <p:notesSz cx="6858000" cy="9144000"/>
@@ -255,7 +256,7 @@
           <a:p>
             <a:fld id="{DE4E7392-00FF-4A5B-A4FB-CA939482D6BD}" type="datetimeFigureOut">
               <a:rPr lang="en-US" smtClean="0"/>
-              <a:t>1/17/2017</a:t>
+              <a:t>8/28/2022</a:t>
             </a:fld>
             <a:endParaRPr lang="en-US"/>
           </a:p>
@@ -423,7 +424,7 @@
           <a:p>
             <a:fld id="{DE4E7392-00FF-4A5B-A4FB-CA939482D6BD}" type="datetimeFigureOut">
               <a:rPr lang="en-US" smtClean="0"/>
-              <a:t>1/17/2017</a:t>
+              <a:t>8/28/2022</a:t>
             </a:fld>
             <a:endParaRPr lang="en-US"/>
           </a:p>
@@ -601,7 +602,7 @@
           <a:p>
             <a:fld id="{DE4E7392-00FF-4A5B-A4FB-CA939482D6BD}" type="datetimeFigureOut">
               <a:rPr lang="en-US" smtClean="0"/>
-              <a:t>1/17/2017</a:t>
+              <a:t>8/28/2022</a:t>
             </a:fld>
             <a:endParaRPr lang="en-US"/>
           </a:p>
@@ -769,7 +770,7 @@
           <a:p>
             <a:fld id="{DE4E7392-00FF-4A5B-A4FB-CA939482D6BD}" type="datetimeFigureOut">
               <a:rPr lang="en-US" smtClean="0"/>
-              <a:t>1/17/2017</a:t>
+              <a:t>8/28/2022</a:t>
             </a:fld>
             <a:endParaRPr lang="en-US"/>
           </a:p>
@@ -1014,7 +1015,7 @@
           <a:p>
             <a:fld id="{DE4E7392-00FF-4A5B-A4FB-CA939482D6BD}" type="datetimeFigureOut">
               <a:rPr lang="en-US" smtClean="0"/>
-              <a:t>1/17/2017</a:t>
+              <a:t>8/28/2022</a:t>
             </a:fld>
             <a:endParaRPr lang="en-US"/>
           </a:p>
@@ -1243,7 +1244,7 @@
           <a:p>
             <a:fld id="{DE4E7392-00FF-4A5B-A4FB-CA939482D6BD}" type="datetimeFigureOut">
               <a:rPr lang="en-US" smtClean="0"/>
-              <a:t>1/17/2017</a:t>
+              <a:t>8/28/2022</a:t>
             </a:fld>
             <a:endParaRPr lang="en-US"/>
           </a:p>
@@ -1607,7 +1608,7 @@
           <a:p>
             <a:fld id="{DE4E7392-00FF-4A5B-A4FB-CA939482D6BD}" type="datetimeFigureOut">
               <a:rPr lang="en-US" smtClean="0"/>
-              <a:t>1/17/2017</a:t>
+              <a:t>8/28/2022</a:t>
             </a:fld>
             <a:endParaRPr lang="en-US"/>
           </a:p>
@@ -1724,7 +1725,7 @@
           <a:p>
             <a:fld id="{DE4E7392-00FF-4A5B-A4FB-CA939482D6BD}" type="datetimeFigureOut">
               <a:rPr lang="en-US" smtClean="0"/>
-              <a:t>1/17/2017</a:t>
+              <a:t>8/28/2022</a:t>
             </a:fld>
             <a:endParaRPr lang="en-US"/>
           </a:p>
@@ -1819,7 +1820,7 @@
           <a:p>
             <a:fld id="{DE4E7392-00FF-4A5B-A4FB-CA939482D6BD}" type="datetimeFigureOut">
               <a:rPr lang="en-US" smtClean="0"/>
-              <a:t>1/17/2017</a:t>
+              <a:t>8/28/2022</a:t>
             </a:fld>
             <a:endParaRPr lang="en-US"/>
           </a:p>
@@ -2094,7 +2095,7 @@
           <a:p>
             <a:fld id="{DE4E7392-00FF-4A5B-A4FB-CA939482D6BD}" type="datetimeFigureOut">
               <a:rPr lang="en-US" smtClean="0"/>
-              <a:t>1/17/2017</a:t>
+              <a:t>8/28/2022</a:t>
             </a:fld>
             <a:endParaRPr lang="en-US"/>
           </a:p>
@@ -2346,7 +2347,7 @@
           <a:p>
             <a:fld id="{DE4E7392-00FF-4A5B-A4FB-CA939482D6BD}" type="datetimeFigureOut">
               <a:rPr lang="en-US" smtClean="0"/>
-              <a:t>1/17/2017</a:t>
+              <a:t>8/28/2022</a:t>
             </a:fld>
             <a:endParaRPr lang="en-US"/>
           </a:p>
@@ -2557,7 +2558,7 @@
           <a:p>
             <a:fld id="{DE4E7392-00FF-4A5B-A4FB-CA939482D6BD}" type="datetimeFigureOut">
               <a:rPr lang="en-US" smtClean="0"/>
-              <a:t>1/17/2017</a:t>
+              <a:t>8/28/2022</a:t>
             </a:fld>
             <a:endParaRPr lang="en-US"/>
           </a:p>
@@ -2994,13 +2995,15 @@
       <p:cxnSp>
         <p:nvCxnSpPr>
           <p:cNvPr id="92" name="Elbow Connector 37"/>
-          <p:cNvCxnSpPr/>
+          <p:cNvCxnSpPr>
+            <a:cxnSpLocks/>
+          </p:cNvCxnSpPr>
           <p:nvPr/>
         </p:nvCxnSpPr>
         <p:spPr>
           <a:xfrm flipH="1">
-            <a:off x="6971334" y="5404066"/>
-            <a:ext cx="2131845" cy="0"/>
+            <a:off x="6916716" y="5677998"/>
+            <a:ext cx="2186463" cy="0"/>
           </a:xfrm>
           <a:prstGeom prst="straightConnector1">
             <a:avLst/>
@@ -3151,14 +3154,15 @@
         <p:nvCxnSpPr>
           <p:cNvPr id="96" name="Elbow Connector 37"/>
           <p:cNvCxnSpPr>
+            <a:cxnSpLocks/>
             <a:stCxn id="118" idx="2"/>
           </p:cNvCxnSpPr>
           <p:nvPr/>
         </p:nvCxnSpPr>
         <p:spPr>
           <a:xfrm flipH="1">
-            <a:off x="9890349" y="4439581"/>
-            <a:ext cx="105605" cy="752904"/>
+            <a:off x="9923362" y="4439581"/>
+            <a:ext cx="72592" cy="1015953"/>
           </a:xfrm>
           <a:prstGeom prst="straightConnector1">
             <a:avLst/>
@@ -3186,6 +3190,7 @@
         <p:nvCxnSpPr>
           <p:cNvPr id="97" name="Elbow Connector 37"/>
           <p:cNvCxnSpPr>
+            <a:cxnSpLocks/>
             <a:stCxn id="109" idx="0"/>
           </p:cNvCxnSpPr>
           <p:nvPr/>
@@ -3193,7 +3198,7 @@
         <p:spPr>
           <a:xfrm flipV="1">
             <a:off x="1972972" y="2631904"/>
-            <a:ext cx="46923" cy="1141150"/>
+            <a:ext cx="0" cy="1141150"/>
           </a:xfrm>
           <a:prstGeom prst="straightConnector1">
             <a:avLst/>
@@ -3220,13 +3225,15 @@
       <p:cxnSp>
         <p:nvCxnSpPr>
           <p:cNvPr id="98" name="Elbow Connector 37"/>
-          <p:cNvCxnSpPr/>
+          <p:cNvCxnSpPr>
+            <a:cxnSpLocks/>
+          </p:cNvCxnSpPr>
           <p:nvPr/>
         </p:nvCxnSpPr>
         <p:spPr>
           <a:xfrm flipH="1" flipV="1">
-            <a:off x="4690123" y="3210741"/>
-            <a:ext cx="9978" cy="724935"/>
+            <a:off x="4997447" y="3082724"/>
+            <a:ext cx="3594" cy="852952"/>
           </a:xfrm>
           <a:prstGeom prst="straightConnector1">
             <a:avLst/>
@@ -3253,13 +3260,15 @@
       <p:cxnSp>
         <p:nvCxnSpPr>
           <p:cNvPr id="99" name="Elbow Connector 37"/>
-          <p:cNvCxnSpPr/>
+          <p:cNvCxnSpPr>
+            <a:cxnSpLocks/>
+          </p:cNvCxnSpPr>
           <p:nvPr/>
         </p:nvCxnSpPr>
         <p:spPr>
           <a:xfrm flipV="1">
-            <a:off x="4209686" y="3243256"/>
-            <a:ext cx="1522" cy="692419"/>
+            <a:off x="4510626" y="3082724"/>
+            <a:ext cx="0" cy="852951"/>
           </a:xfrm>
           <a:prstGeom prst="straightConnector1">
             <a:avLst/>
@@ -3596,7 +3605,7 @@
         </p:nvSpPr>
         <p:spPr>
           <a:xfrm>
-            <a:off x="3510547" y="3133637"/>
+            <a:off x="3811487" y="3133637"/>
             <a:ext cx="651717" cy="338554"/>
           </a:xfrm>
           <a:prstGeom prst="rect">
@@ -3625,7 +3634,7 @@
         </p:nvSpPr>
         <p:spPr>
           <a:xfrm>
-            <a:off x="4690123" y="3130377"/>
+            <a:off x="4991063" y="3130377"/>
             <a:ext cx="1060483" cy="338554"/>
           </a:xfrm>
           <a:prstGeom prst="rect">
@@ -3649,13 +3658,16 @@
       <p:cxnSp>
         <p:nvCxnSpPr>
           <p:cNvPr id="107" name="Elbow Connector 37"/>
-          <p:cNvCxnSpPr/>
+          <p:cNvCxnSpPr>
+            <a:cxnSpLocks/>
+            <a:endCxn id="108" idx="1"/>
+          </p:cNvCxnSpPr>
           <p:nvPr/>
         </p:nvCxnSpPr>
         <p:spPr>
           <a:xfrm flipV="1">
-            <a:off x="2804345" y="4155349"/>
-            <a:ext cx="706202" cy="2"/>
+            <a:off x="2804345" y="4137302"/>
+            <a:ext cx="1056086" cy="18049"/>
           </a:xfrm>
           <a:prstGeom prst="straightConnector1">
             <a:avLst/>
@@ -3687,7 +3699,7 @@
         </p:nvSpPr>
         <p:spPr>
           <a:xfrm>
-            <a:off x="3559491" y="3773054"/>
+            <a:off x="3860431" y="3773054"/>
             <a:ext cx="1694439" cy="728495"/>
           </a:xfrm>
           <a:prstGeom prst="roundRect">
@@ -3810,7 +3822,7 @@
         </p:nvCxnSpPr>
         <p:spPr>
           <a:xfrm flipH="1">
-            <a:off x="3126921" y="5404066"/>
+            <a:off x="3126921" y="5677998"/>
             <a:ext cx="1776467" cy="0"/>
           </a:xfrm>
           <a:prstGeom prst="straightConnector1">
@@ -3843,7 +3855,7 @@
         </p:nvSpPr>
         <p:spPr>
           <a:xfrm>
-            <a:off x="1166706" y="4964125"/>
+            <a:off x="1166706" y="5238057"/>
             <a:ext cx="1880062" cy="728495"/>
           </a:xfrm>
           <a:prstGeom prst="roundRect">
@@ -3908,7 +3920,7 @@
         </p:nvSpPr>
         <p:spPr>
           <a:xfrm>
-            <a:off x="9043129" y="5267199"/>
+            <a:off x="9043129" y="5541131"/>
             <a:ext cx="1694439" cy="728495"/>
           </a:xfrm>
           <a:prstGeom prst="roundRect">
@@ -3963,13 +3975,15 @@
       <p:cxnSp>
         <p:nvCxnSpPr>
           <p:cNvPr id="113" name="Elbow Connector 37"/>
-          <p:cNvCxnSpPr/>
+          <p:cNvCxnSpPr>
+            <a:cxnSpLocks/>
+          </p:cNvCxnSpPr>
           <p:nvPr/>
         </p:nvCxnSpPr>
         <p:spPr>
           <a:xfrm flipH="1" flipV="1">
             <a:off x="7974139" y="4612423"/>
-            <a:ext cx="1189589" cy="654777"/>
+            <a:ext cx="1193010" cy="849625"/>
           </a:xfrm>
           <a:prstGeom prst="straightConnector1">
             <a:avLst/>
@@ -4090,7 +4104,7 @@
         </p:nvSpPr>
         <p:spPr>
           <a:xfrm>
-            <a:off x="4941593" y="5066107"/>
+            <a:off x="4941593" y="5340039"/>
             <a:ext cx="1880062" cy="728495"/>
           </a:xfrm>
           <a:prstGeom prst="roundRect">
@@ -4394,13 +4408,16 @@
       <p:cxnSp>
         <p:nvCxnSpPr>
           <p:cNvPr id="121" name="Elbow Connector 37"/>
-          <p:cNvCxnSpPr/>
+          <p:cNvCxnSpPr>
+            <a:cxnSpLocks/>
+            <a:endCxn id="108" idx="3"/>
+          </p:cNvCxnSpPr>
           <p:nvPr/>
         </p:nvCxnSpPr>
         <p:spPr>
-          <a:xfrm flipH="1" flipV="1">
-            <a:off x="5396593" y="4137301"/>
-            <a:ext cx="883108" cy="1"/>
+          <a:xfrm flipH="1">
+            <a:off x="5554870" y="4137302"/>
+            <a:ext cx="724831" cy="0"/>
           </a:xfrm>
           <a:prstGeom prst="straightConnector1">
             <a:avLst/>
@@ -4432,7 +4449,7 @@
         </p:nvSpPr>
         <p:spPr>
           <a:xfrm>
-            <a:off x="3053363" y="3378557"/>
+            <a:off x="3354303" y="3378557"/>
             <a:ext cx="1113638" cy="338554"/>
           </a:xfrm>
           <a:prstGeom prst="rect">
@@ -4461,7 +4478,7 @@
         </p:nvSpPr>
         <p:spPr>
           <a:xfrm>
-            <a:off x="4681959" y="3375297"/>
+            <a:off x="4982899" y="3375297"/>
             <a:ext cx="1107996" cy="338554"/>
           </a:xfrm>
           <a:prstGeom prst="rect">
@@ -4483,6 +4500,113 @@
           </a:p>
         </p:txBody>
       </p:sp>
+      <p:sp>
+        <p:nvSpPr>
+          <p:cNvPr id="4" name="Rounded Rectangle 6">
+            <a:extLst>
+              <a:ext uri="{FF2B5EF4-FFF2-40B4-BE49-F238E27FC236}">
+                <a16:creationId xmlns:a16="http://schemas.microsoft.com/office/drawing/2014/main" id="{7E0A996B-4F87-CC97-170D-E56DB97330E9}"/>
+              </a:ext>
+            </a:extLst>
+          </p:cNvPr>
+          <p:cNvSpPr/>
+          <p:nvPr/>
+        </p:nvSpPr>
+        <p:spPr>
+          <a:xfrm>
+            <a:off x="3125455" y="4630522"/>
+            <a:ext cx="1694439" cy="728495"/>
+          </a:xfrm>
+          <a:prstGeom prst="roundRect">
+            <a:avLst/>
+          </a:prstGeom>
+          <a:solidFill>
+            <a:srgbClr val="CEE1F2"/>
+          </a:solidFill>
+          <a:ln cap="rnd">
+            <a:round/>
+          </a:ln>
+          <a:effectLst>
+            <a:outerShdw blurRad="50800" dist="38100" dir="2700000" algn="tl" rotWithShape="0">
+              <a:prstClr val="black">
+                <a:alpha val="40000"/>
+              </a:prstClr>
+            </a:outerShdw>
+          </a:effectLst>
+        </p:spPr>
+        <p:style>
+          <a:lnRef idx="2">
+            <a:schemeClr val="accent1">
+              <a:shade val="50000"/>
+            </a:schemeClr>
+          </a:lnRef>
+          <a:fillRef idx="1">
+            <a:schemeClr val="accent1"/>
+          </a:fillRef>
+          <a:effectRef idx="0">
+            <a:schemeClr val="accent1"/>
+          </a:effectRef>
+          <a:fontRef idx="minor">
+            <a:schemeClr val="lt1"/>
+          </a:fontRef>
+        </p:style>
+        <p:txBody>
+          <a:bodyPr rtlCol="0" anchor="ctr"/>
+          <a:lstStyle/>
+          <a:p>
+            <a:pPr algn="ctr"/>
+            <a:r>
+              <a:rPr lang="en-US" dirty="0">
+                <a:solidFill>
+                  <a:schemeClr val="tx1"/>
+                </a:solidFill>
+              </a:rPr>
+              <a:t>Contract</a:t>
+            </a:r>
+          </a:p>
+        </p:txBody>
+      </p:sp>
+      <p:cxnSp>
+        <p:nvCxnSpPr>
+          <p:cNvPr id="7" name="Elbow Connector 37">
+            <a:extLst>
+              <a:ext uri="{FF2B5EF4-FFF2-40B4-BE49-F238E27FC236}">
+                <a16:creationId xmlns:a16="http://schemas.microsoft.com/office/drawing/2014/main" id="{90C98090-740E-A23D-B277-F8756424E220}"/>
+              </a:ext>
+            </a:extLst>
+          </p:cNvPr>
+          <p:cNvCxnSpPr>
+            <a:cxnSpLocks/>
+          </p:cNvCxnSpPr>
+          <p:nvPr/>
+        </p:nvCxnSpPr>
+        <p:spPr>
+          <a:xfrm flipV="1">
+            <a:off x="3247056" y="3082724"/>
+            <a:ext cx="0" cy="1529699"/>
+          </a:xfrm>
+          <a:prstGeom prst="straightConnector1">
+            <a:avLst/>
+          </a:prstGeom>
+          <a:ln>
+            <a:tailEnd type="triangle"/>
+          </a:ln>
+        </p:spPr>
+        <p:style>
+          <a:lnRef idx="3">
+            <a:schemeClr val="dk1"/>
+          </a:lnRef>
+          <a:fillRef idx="0">
+            <a:schemeClr val="dk1"/>
+          </a:fillRef>
+          <a:effectRef idx="2">
+            <a:schemeClr val="dk1"/>
+          </a:effectRef>
+          <a:fontRef idx="minor">
+            <a:schemeClr val="tx1"/>
+          </a:fontRef>
+        </p:style>
+      </p:cxnSp>
     </p:spTree>
     <p:extLst>
       <p:ext uri="{BB962C8B-B14F-4D97-AF65-F5344CB8AC3E}">
@@ -4583,7 +4707,7 @@
         </p:nvCxnSpPr>
         <p:spPr>
           <a:xfrm flipH="1" flipV="1">
-            <a:off x="6119927" y="2755322"/>
+            <a:off x="6478737" y="2755322"/>
             <a:ext cx="13220" cy="1840214"/>
           </a:xfrm>
           <a:prstGeom prst="straightConnector1">
@@ -4650,7 +4774,7 @@
         <p:spPr>
           <a:xfrm>
             <a:off x="1065595" y="1081023"/>
-            <a:ext cx="5943198" cy="1458695"/>
+            <a:ext cx="5943198" cy="1250017"/>
           </a:xfrm>
           <a:prstGeom prst="roundRect">
             <a:avLst/>
@@ -4735,47 +4859,15 @@
         <p:nvCxnSpPr>
           <p:cNvPr id="97" name="Elbow Connector 37"/>
           <p:cNvCxnSpPr>
+            <a:cxnSpLocks/>
             <a:stCxn id="109" idx="0"/>
           </p:cNvCxnSpPr>
           <p:nvPr/>
         </p:nvCxnSpPr>
         <p:spPr>
           <a:xfrm flipV="1">
-            <a:off x="2160111" y="2176992"/>
-            <a:ext cx="0" cy="1141150"/>
-          </a:xfrm>
-          <a:prstGeom prst="straightConnector1">
-            <a:avLst/>
-          </a:prstGeom>
-          <a:ln>
-            <a:tailEnd type="triangle"/>
-          </a:ln>
-        </p:spPr>
-        <p:style>
-          <a:lnRef idx="3">
-            <a:schemeClr val="dk1"/>
-          </a:lnRef>
-          <a:fillRef idx="0">
-            <a:schemeClr val="dk1"/>
-          </a:fillRef>
-          <a:effectRef idx="2">
-            <a:schemeClr val="dk1"/>
-          </a:effectRef>
-          <a:fontRef idx="minor">
-            <a:schemeClr val="tx1"/>
-          </a:fontRef>
-        </p:style>
-      </p:cxnSp>
-      <p:cxnSp>
-        <p:nvCxnSpPr>
-          <p:cNvPr id="98" name="Elbow Connector 37"/>
-          <p:cNvCxnSpPr/>
-          <p:nvPr/>
-        </p:nvCxnSpPr>
-        <p:spPr>
-          <a:xfrm flipH="1" flipV="1">
-            <a:off x="4877262" y="2755829"/>
-            <a:ext cx="9978" cy="724935"/>
+            <a:off x="2160111" y="2083443"/>
+            <a:ext cx="0" cy="1234699"/>
           </a:xfrm>
           <a:prstGeom prst="straightConnector1">
             <a:avLst/>
@@ -4802,13 +4894,15 @@
       <p:cxnSp>
         <p:nvCxnSpPr>
           <p:cNvPr id="99" name="Elbow Connector 37"/>
-          <p:cNvCxnSpPr/>
+          <p:cNvCxnSpPr>
+            <a:cxnSpLocks/>
+          </p:cNvCxnSpPr>
           <p:nvPr/>
         </p:nvCxnSpPr>
         <p:spPr>
           <a:xfrm flipV="1">
-            <a:off x="4396825" y="2788344"/>
-            <a:ext cx="1522" cy="692419"/>
+            <a:off x="4169193" y="2388243"/>
+            <a:ext cx="0" cy="1092520"/>
           </a:xfrm>
           <a:prstGeom prst="straightConnector1">
             <a:avLst/>
@@ -5083,7 +5177,7 @@
         </p:nvSpPr>
         <p:spPr>
           <a:xfrm>
-            <a:off x="3697686" y="2752201"/>
+            <a:off x="3470054" y="2316231"/>
             <a:ext cx="651717" cy="338554"/>
           </a:xfrm>
           <a:prstGeom prst="rect">
@@ -5104,45 +5198,18 @@
           </a:p>
         </p:txBody>
       </p:sp>
-      <p:sp>
-        <p:nvSpPr>
-          <p:cNvPr id="106" name="TextBox 105"/>
-          <p:cNvSpPr txBox="1"/>
-          <p:nvPr/>
-        </p:nvSpPr>
-        <p:spPr>
-          <a:xfrm>
-            <a:off x="4877262" y="2765269"/>
-            <a:ext cx="1060483" cy="338554"/>
-          </a:xfrm>
-          <a:prstGeom prst="rect">
-            <a:avLst/>
-          </a:prstGeom>
-          <a:noFill/>
-        </p:spPr>
-        <p:txBody>
-          <a:bodyPr wrap="none" rtlCol="0">
-            <a:spAutoFit/>
-          </a:bodyPr>
-          <a:lstStyle/>
-          <a:p>
-            <a:r>
-              <a:rPr lang="en-US" sz="1600" dirty="0"/>
-              <a:t>Subscriber</a:t>
-            </a:r>
-          </a:p>
-        </p:txBody>
-      </p:sp>
       <p:cxnSp>
         <p:nvCxnSpPr>
           <p:cNvPr id="107" name="Elbow Connector 37"/>
-          <p:cNvCxnSpPr/>
+          <p:cNvCxnSpPr>
+            <a:cxnSpLocks/>
+          </p:cNvCxnSpPr>
           <p:nvPr/>
         </p:nvCxnSpPr>
         <p:spPr>
-          <a:xfrm flipV="1">
-            <a:off x="2991484" y="3700437"/>
-            <a:ext cx="706202" cy="2"/>
+          <a:xfrm>
+            <a:off x="2991484" y="3700439"/>
+            <a:ext cx="551183" cy="8455"/>
           </a:xfrm>
           <a:prstGeom prst="straightConnector1">
             <a:avLst/>
@@ -5174,8 +5241,8 @@
         </p:nvSpPr>
         <p:spPr>
           <a:xfrm>
-            <a:off x="3746630" y="3318142"/>
-            <a:ext cx="1694439" cy="728495"/>
+            <a:off x="3588452" y="3318142"/>
+            <a:ext cx="1192341" cy="728495"/>
           </a:xfrm>
           <a:prstGeom prst="roundRect">
             <a:avLst/>
@@ -5331,7 +5398,7 @@
         <p:spPr>
           <a:xfrm>
             <a:off x="7027294" y="2536483"/>
-            <a:ext cx="2056691" cy="1196139"/>
+            <a:ext cx="2348200" cy="1196139"/>
           </a:xfrm>
           <a:prstGeom prst="roundRect">
             <a:avLst/>
@@ -5399,7 +5466,7 @@
                   </a:schemeClr>
                 </a:solidFill>
               </a:rPr>
-              <a:t>(Medication Request / Vision Prescription)</a:t>
+              <a:t>(Medication Request / Service Request / Vision Prescription)</a:t>
             </a:r>
             <a:endParaRPr lang="en-AU" dirty="0">
               <a:solidFill>
@@ -5652,7 +5719,7 @@
         </p:nvSpPr>
         <p:spPr>
           <a:xfrm>
-            <a:off x="6126537" y="3500935"/>
+            <a:off x="6454483" y="3724710"/>
             <a:ext cx="675698" cy="338554"/>
           </a:xfrm>
           <a:prstGeom prst="rect">
@@ -5946,8 +6013,8 @@
         </p:nvSpPr>
         <p:spPr>
           <a:xfrm>
-            <a:off x="3241135" y="2986685"/>
-            <a:ext cx="1113638" cy="338554"/>
+            <a:off x="3013503" y="2550715"/>
+            <a:ext cx="1113638" cy="830997"/>
           </a:xfrm>
           <a:prstGeom prst="rect">
             <a:avLst/>
@@ -5965,29 +6032,12 @@
               <a:t>Beneficiary</a:t>
             </a:r>
           </a:p>
-        </p:txBody>
-      </p:sp>
-      <p:sp>
-        <p:nvSpPr>
-          <p:cNvPr id="33" name="TextBox 32"/>
-          <p:cNvSpPr txBox="1"/>
-          <p:nvPr/>
-        </p:nvSpPr>
-        <p:spPr>
-          <a:xfrm>
-            <a:off x="4869731" y="2983425"/>
-            <a:ext cx="1107996" cy="338554"/>
-          </a:xfrm>
-          <a:prstGeom prst="rect">
-            <a:avLst/>
-          </a:prstGeom>
-          <a:noFill/>
-        </p:spPr>
-        <p:txBody>
-          <a:bodyPr wrap="none" rtlCol="0">
-            <a:spAutoFit/>
-          </a:bodyPr>
-          <a:lstStyle/>
+          <a:p>
+            <a:r>
+              <a:rPr lang="en-US" sz="1600" dirty="0"/>
+              <a:t>Subscriber</a:t>
+            </a:r>
+          </a:p>
           <a:p>
             <a:r>
               <a:rPr lang="en-US" sz="1600" dirty="0" err="1"/>
@@ -6077,7 +6127,7 @@
         </p:nvCxnSpPr>
         <p:spPr>
           <a:xfrm flipH="1" flipV="1">
-            <a:off x="3137255" y="4082734"/>
+            <a:off x="3043755" y="4085842"/>
             <a:ext cx="305994" cy="296549"/>
           </a:xfrm>
           <a:prstGeom prst="straightConnector1">
@@ -6115,6 +6165,154 @@
           <a:xfrm flipH="1" flipV="1">
             <a:off x="4626187" y="4770846"/>
             <a:ext cx="312784" cy="18704"/>
+          </a:xfrm>
+          <a:prstGeom prst="straightConnector1">
+            <a:avLst/>
+          </a:prstGeom>
+          <a:ln>
+            <a:tailEnd type="triangle"/>
+          </a:ln>
+        </p:spPr>
+        <p:style>
+          <a:lnRef idx="3">
+            <a:schemeClr val="dk1"/>
+          </a:lnRef>
+          <a:fillRef idx="0">
+            <a:schemeClr val="dk1"/>
+          </a:fillRef>
+          <a:effectRef idx="2">
+            <a:schemeClr val="dk1"/>
+          </a:effectRef>
+          <a:fontRef idx="minor">
+            <a:schemeClr val="tx1"/>
+          </a:fontRef>
+        </p:style>
+      </p:cxnSp>
+      <p:cxnSp>
+        <p:nvCxnSpPr>
+          <p:cNvPr id="8" name="Elbow Connector 37">
+            <a:extLst>
+              <a:ext uri="{FF2B5EF4-FFF2-40B4-BE49-F238E27FC236}">
+                <a16:creationId xmlns:a16="http://schemas.microsoft.com/office/drawing/2014/main" id="{9C494BE2-08BC-3DC0-AF89-41B3AACE5080}"/>
+              </a:ext>
+            </a:extLst>
+          </p:cNvPr>
+          <p:cNvCxnSpPr>
+            <a:cxnSpLocks/>
+          </p:cNvCxnSpPr>
+          <p:nvPr/>
+        </p:nvCxnSpPr>
+        <p:spPr>
+          <a:xfrm flipH="1" flipV="1">
+            <a:off x="6189671" y="2371309"/>
+            <a:ext cx="2528" cy="1092521"/>
+          </a:xfrm>
+          <a:prstGeom prst="straightConnector1">
+            <a:avLst/>
+          </a:prstGeom>
+          <a:ln>
+            <a:tailEnd type="triangle"/>
+          </a:ln>
+        </p:spPr>
+        <p:style>
+          <a:lnRef idx="3">
+            <a:schemeClr val="dk1"/>
+          </a:lnRef>
+          <a:fillRef idx="0">
+            <a:schemeClr val="dk1"/>
+          </a:fillRef>
+          <a:effectRef idx="2">
+            <a:schemeClr val="dk1"/>
+          </a:effectRef>
+          <a:fontRef idx="minor">
+            <a:schemeClr val="tx1"/>
+          </a:fontRef>
+        </p:style>
+      </p:cxnSp>
+      <p:sp>
+        <p:nvSpPr>
+          <p:cNvPr id="9" name="Rounded Rectangle 6">
+            <a:extLst>
+              <a:ext uri="{FF2B5EF4-FFF2-40B4-BE49-F238E27FC236}">
+                <a16:creationId xmlns:a16="http://schemas.microsoft.com/office/drawing/2014/main" id="{3F968F17-19E9-C4BB-4BA6-783BBA4A1944}"/>
+              </a:ext>
+            </a:extLst>
+          </p:cNvPr>
+          <p:cNvSpPr/>
+          <p:nvPr/>
+        </p:nvSpPr>
+        <p:spPr>
+          <a:xfrm>
+            <a:off x="5182775" y="3301208"/>
+            <a:ext cx="1192341" cy="728495"/>
+          </a:xfrm>
+          <a:prstGeom prst="roundRect">
+            <a:avLst/>
+          </a:prstGeom>
+          <a:solidFill>
+            <a:srgbClr val="CEE1F2"/>
+          </a:solidFill>
+          <a:ln cap="rnd">
+            <a:round/>
+          </a:ln>
+          <a:effectLst>
+            <a:outerShdw blurRad="50800" dist="38100" dir="2700000" algn="tl" rotWithShape="0">
+              <a:prstClr val="black">
+                <a:alpha val="40000"/>
+              </a:prstClr>
+            </a:outerShdw>
+          </a:effectLst>
+        </p:spPr>
+        <p:style>
+          <a:lnRef idx="2">
+            <a:schemeClr val="accent1">
+              <a:shade val="50000"/>
+            </a:schemeClr>
+          </a:lnRef>
+          <a:fillRef idx="1">
+            <a:schemeClr val="accent1"/>
+          </a:fillRef>
+          <a:effectRef idx="0">
+            <a:schemeClr val="accent1"/>
+          </a:effectRef>
+          <a:fontRef idx="minor">
+            <a:schemeClr val="lt1"/>
+          </a:fontRef>
+        </p:style>
+        <p:txBody>
+          <a:bodyPr rtlCol="0" anchor="ctr"/>
+          <a:lstStyle/>
+          <a:p>
+            <a:pPr algn="ctr"/>
+            <a:r>
+              <a:rPr lang="en-US" dirty="0">
+                <a:solidFill>
+                  <a:schemeClr val="tx1"/>
+                </a:solidFill>
+              </a:rPr>
+              <a:t>Contract</a:t>
+            </a:r>
+          </a:p>
+        </p:txBody>
+      </p:sp>
+      <p:cxnSp>
+        <p:nvCxnSpPr>
+          <p:cNvPr id="12" name="Elbow Connector 37">
+            <a:extLst>
+              <a:ext uri="{FF2B5EF4-FFF2-40B4-BE49-F238E27FC236}">
+                <a16:creationId xmlns:a16="http://schemas.microsoft.com/office/drawing/2014/main" id="{036AECDE-DC62-2EE4-65D3-5A8689755B6B}"/>
+              </a:ext>
+            </a:extLst>
+          </p:cNvPr>
+          <p:cNvCxnSpPr>
+            <a:cxnSpLocks/>
+          </p:cNvCxnSpPr>
+          <p:nvPr/>
+        </p:nvCxnSpPr>
+        <p:spPr>
+          <a:xfrm flipH="1">
+            <a:off x="4878508" y="3716623"/>
+            <a:ext cx="316585" cy="0"/>
           </a:xfrm>
           <a:prstGeom prst="straightConnector1">
             <a:avLst/>
@@ -9155,6 +9353,1862 @@
     <p:extLst>
       <p:ext uri="{BB962C8B-B14F-4D97-AF65-F5344CB8AC3E}">
         <p14:creationId xmlns:p14="http://schemas.microsoft.com/office/powerpoint/2010/main" val="2069018942"/>
+      </p:ext>
+    </p:extLst>
+  </p:cSld>
+  <p:clrMapOvr>
+    <a:masterClrMapping/>
+  </p:clrMapOvr>
+</p:sld>
+</file>
+
+<file path=ppt/slides/slide5.xml><?xml version="1.0" encoding="utf-8"?>
+<p:sld xmlns:a="http://schemas.openxmlformats.org/drawingml/2006/main" xmlns:r="http://schemas.openxmlformats.org/officeDocument/2006/relationships" xmlns:p="http://schemas.openxmlformats.org/presentationml/2006/main">
+  <p:cSld>
+    <p:spTree>
+      <p:nvGrpSpPr>
+        <p:cNvPr id="1" name=""/>
+        <p:cNvGrpSpPr/>
+        <p:nvPr/>
+      </p:nvGrpSpPr>
+      <p:grpSpPr>
+        <a:xfrm>
+          <a:off x="0" y="0"/>
+          <a:ext cx="0" cy="0"/>
+          <a:chOff x="0" y="0"/>
+          <a:chExt cx="0" cy="0"/>
+        </a:xfrm>
+      </p:grpSpPr>
+      <p:sp>
+        <p:nvSpPr>
+          <p:cNvPr id="2" name="Title 1"/>
+          <p:cNvSpPr>
+            <a:spLocks noGrp="1"/>
+          </p:cNvSpPr>
+          <p:nvPr>
+            <p:ph type="title"/>
+          </p:nvPr>
+        </p:nvSpPr>
+        <p:spPr>
+          <a:xfrm>
+            <a:off x="0" y="0"/>
+            <a:ext cx="5427602" cy="847941"/>
+          </a:xfrm>
+        </p:spPr>
+        <p:txBody>
+          <a:bodyPr>
+            <a:normAutofit/>
+          </a:bodyPr>
+          <a:lstStyle/>
+          <a:p>
+            <a:r>
+              <a:rPr lang="en-AU" dirty="0"/>
+              <a:t>Finance Interactions</a:t>
+            </a:r>
+          </a:p>
+        </p:txBody>
+      </p:sp>
+      <p:cxnSp>
+        <p:nvCxnSpPr>
+          <p:cNvPr id="92" name="Elbow Connector 37"/>
+          <p:cNvCxnSpPr>
+            <a:cxnSpLocks/>
+          </p:cNvCxnSpPr>
+          <p:nvPr/>
+        </p:nvCxnSpPr>
+        <p:spPr>
+          <a:xfrm>
+            <a:off x="2874380" y="6006801"/>
+            <a:ext cx="810228" cy="0"/>
+          </a:xfrm>
+          <a:prstGeom prst="straightConnector1">
+            <a:avLst/>
+          </a:prstGeom>
+          <a:ln>
+            <a:tailEnd type="triangle"/>
+          </a:ln>
+        </p:spPr>
+        <p:style>
+          <a:lnRef idx="3">
+            <a:schemeClr val="dk1"/>
+          </a:lnRef>
+          <a:fillRef idx="0">
+            <a:schemeClr val="dk1"/>
+          </a:fillRef>
+          <a:effectRef idx="2">
+            <a:schemeClr val="dk1"/>
+          </a:effectRef>
+          <a:fontRef idx="minor">
+            <a:schemeClr val="tx1"/>
+          </a:fontRef>
+        </p:style>
+      </p:cxnSp>
+      <p:cxnSp>
+        <p:nvCxnSpPr>
+          <p:cNvPr id="93" name="Elbow Connector 37"/>
+          <p:cNvCxnSpPr>
+            <a:cxnSpLocks/>
+          </p:cNvCxnSpPr>
+          <p:nvPr/>
+        </p:nvCxnSpPr>
+        <p:spPr>
+          <a:xfrm flipV="1">
+            <a:off x="6491957" y="2371309"/>
+            <a:ext cx="0" cy="2224227"/>
+          </a:xfrm>
+          <a:prstGeom prst="straightConnector1">
+            <a:avLst/>
+          </a:prstGeom>
+          <a:ln>
+            <a:tailEnd type="triangle"/>
+          </a:ln>
+        </p:spPr>
+        <p:style>
+          <a:lnRef idx="3">
+            <a:schemeClr val="dk1"/>
+          </a:lnRef>
+          <a:fillRef idx="0">
+            <a:schemeClr val="dk1"/>
+          </a:fillRef>
+          <a:effectRef idx="2">
+            <a:schemeClr val="dk1"/>
+          </a:effectRef>
+          <a:fontRef idx="minor">
+            <a:schemeClr val="tx1"/>
+          </a:fontRef>
+        </p:style>
+      </p:cxnSp>
+      <p:cxnSp>
+        <p:nvCxnSpPr>
+          <p:cNvPr id="94" name="Elbow Connector 37"/>
+          <p:cNvCxnSpPr/>
+          <p:nvPr/>
+        </p:nvCxnSpPr>
+        <p:spPr>
+          <a:xfrm flipV="1">
+            <a:off x="6310378" y="4752131"/>
+            <a:ext cx="949174" cy="18715"/>
+          </a:xfrm>
+          <a:prstGeom prst="straightConnector1">
+            <a:avLst/>
+          </a:prstGeom>
+          <a:ln>
+            <a:tailEnd type="triangle"/>
+          </a:ln>
+        </p:spPr>
+        <p:style>
+          <a:lnRef idx="3">
+            <a:schemeClr val="dk1"/>
+          </a:lnRef>
+          <a:fillRef idx="0">
+            <a:schemeClr val="dk1"/>
+          </a:fillRef>
+          <a:effectRef idx="2">
+            <a:schemeClr val="dk1"/>
+          </a:effectRef>
+          <a:fontRef idx="minor">
+            <a:schemeClr val="tx1"/>
+          </a:fontRef>
+        </p:style>
+      </p:cxnSp>
+      <p:sp>
+        <p:nvSpPr>
+          <p:cNvPr id="95" name="Rounded Rectangle 5"/>
+          <p:cNvSpPr/>
+          <p:nvPr/>
+        </p:nvSpPr>
+        <p:spPr>
+          <a:xfrm>
+            <a:off x="1065595" y="1081023"/>
+            <a:ext cx="5943198" cy="1250017"/>
+          </a:xfrm>
+          <a:prstGeom prst="roundRect">
+            <a:avLst/>
+          </a:prstGeom>
+          <a:solidFill>
+            <a:schemeClr val="bg1"/>
+          </a:solidFill>
+          <a:ln cap="rnd">
+            <a:round/>
+          </a:ln>
+          <a:effectLst>
+            <a:outerShdw blurRad="50800" dist="38100" dir="2700000" algn="tl" rotWithShape="0">
+              <a:prstClr val="black">
+                <a:alpha val="40000"/>
+              </a:prstClr>
+            </a:outerShdw>
+          </a:effectLst>
+        </p:spPr>
+        <p:style>
+          <a:lnRef idx="2">
+            <a:schemeClr val="accent1">
+              <a:shade val="50000"/>
+            </a:schemeClr>
+          </a:lnRef>
+          <a:fillRef idx="1">
+            <a:schemeClr val="accent1"/>
+          </a:fillRef>
+          <a:effectRef idx="0">
+            <a:schemeClr val="accent1"/>
+          </a:effectRef>
+          <a:fontRef idx="minor">
+            <a:schemeClr val="lt1"/>
+          </a:fontRef>
+        </p:style>
+        <p:txBody>
+          <a:bodyPr rtlCol="0" anchor="ctr"/>
+          <a:lstStyle/>
+          <a:p>
+            <a:pPr algn="ctr"/>
+            <a:endParaRPr lang="en-AU" dirty="0">
+              <a:solidFill>
+                <a:schemeClr val="tx1"/>
+              </a:solidFill>
+            </a:endParaRPr>
+          </a:p>
+        </p:txBody>
+      </p:sp>
+      <p:cxnSp>
+        <p:nvCxnSpPr>
+          <p:cNvPr id="96" name="Elbow Connector 37"/>
+          <p:cNvCxnSpPr/>
+          <p:nvPr/>
+        </p:nvCxnSpPr>
+        <p:spPr>
+          <a:xfrm flipH="1">
+            <a:off x="5583732" y="6064416"/>
+            <a:ext cx="963499" cy="0"/>
+          </a:xfrm>
+          <a:prstGeom prst="straightConnector1">
+            <a:avLst/>
+          </a:prstGeom>
+          <a:ln>
+            <a:tailEnd type="triangle"/>
+          </a:ln>
+        </p:spPr>
+        <p:style>
+          <a:lnRef idx="3">
+            <a:schemeClr val="dk1"/>
+          </a:lnRef>
+          <a:fillRef idx="0">
+            <a:schemeClr val="dk1"/>
+          </a:fillRef>
+          <a:effectRef idx="2">
+            <a:schemeClr val="dk1"/>
+          </a:effectRef>
+          <a:fontRef idx="minor">
+            <a:schemeClr val="tx1"/>
+          </a:fontRef>
+        </p:style>
+      </p:cxnSp>
+      <p:cxnSp>
+        <p:nvCxnSpPr>
+          <p:cNvPr id="97" name="Elbow Connector 37"/>
+          <p:cNvCxnSpPr>
+            <a:cxnSpLocks/>
+            <a:stCxn id="109" idx="0"/>
+          </p:cNvCxnSpPr>
+          <p:nvPr/>
+        </p:nvCxnSpPr>
+        <p:spPr>
+          <a:xfrm flipV="1">
+            <a:off x="2160111" y="2083443"/>
+            <a:ext cx="0" cy="1234699"/>
+          </a:xfrm>
+          <a:prstGeom prst="straightConnector1">
+            <a:avLst/>
+          </a:prstGeom>
+          <a:ln>
+            <a:tailEnd type="triangle"/>
+          </a:ln>
+        </p:spPr>
+        <p:style>
+          <a:lnRef idx="3">
+            <a:schemeClr val="dk1"/>
+          </a:lnRef>
+          <a:fillRef idx="0">
+            <a:schemeClr val="dk1"/>
+          </a:fillRef>
+          <a:effectRef idx="2">
+            <a:schemeClr val="dk1"/>
+          </a:effectRef>
+          <a:fontRef idx="minor">
+            <a:schemeClr val="tx1"/>
+          </a:fontRef>
+        </p:style>
+      </p:cxnSp>
+      <p:cxnSp>
+        <p:nvCxnSpPr>
+          <p:cNvPr id="99" name="Elbow Connector 37"/>
+          <p:cNvCxnSpPr>
+            <a:cxnSpLocks/>
+          </p:cNvCxnSpPr>
+          <p:nvPr/>
+        </p:nvCxnSpPr>
+        <p:spPr>
+          <a:xfrm flipV="1">
+            <a:off x="4169193" y="2388243"/>
+            <a:ext cx="0" cy="1092520"/>
+          </a:xfrm>
+          <a:prstGeom prst="straightConnector1">
+            <a:avLst/>
+          </a:prstGeom>
+          <a:ln>
+            <a:tailEnd type="triangle"/>
+          </a:ln>
+        </p:spPr>
+        <p:style>
+          <a:lnRef idx="3">
+            <a:schemeClr val="dk1"/>
+          </a:lnRef>
+          <a:fillRef idx="0">
+            <a:schemeClr val="dk1"/>
+          </a:fillRef>
+          <a:effectRef idx="2">
+            <a:schemeClr val="dk1"/>
+          </a:effectRef>
+          <a:fontRef idx="minor">
+            <a:schemeClr val="tx1"/>
+          </a:fontRef>
+        </p:style>
+      </p:cxnSp>
+      <p:cxnSp>
+        <p:nvCxnSpPr>
+          <p:cNvPr id="100" name="Elbow Connector 37"/>
+          <p:cNvCxnSpPr/>
+          <p:nvPr/>
+        </p:nvCxnSpPr>
+        <p:spPr>
+          <a:xfrm flipH="1" flipV="1">
+            <a:off x="6196215" y="5306917"/>
+            <a:ext cx="385464" cy="480209"/>
+          </a:xfrm>
+          <a:prstGeom prst="straightConnector1">
+            <a:avLst/>
+          </a:prstGeom>
+          <a:ln>
+            <a:tailEnd type="triangle"/>
+          </a:ln>
+        </p:spPr>
+        <p:style>
+          <a:lnRef idx="3">
+            <a:schemeClr val="dk1"/>
+          </a:lnRef>
+          <a:fillRef idx="0">
+            <a:schemeClr val="dk1"/>
+          </a:fillRef>
+          <a:effectRef idx="2">
+            <a:schemeClr val="dk1"/>
+          </a:effectRef>
+          <a:fontRef idx="minor">
+            <a:schemeClr val="tx1"/>
+          </a:fontRef>
+        </p:style>
+      </p:cxnSp>
+      <p:sp>
+        <p:nvSpPr>
+          <p:cNvPr id="101" name="Rounded Rectangle 5"/>
+          <p:cNvSpPr/>
+          <p:nvPr/>
+        </p:nvSpPr>
+        <p:spPr>
+          <a:xfrm>
+            <a:off x="5090526" y="1298573"/>
+            <a:ext cx="1694439" cy="728495"/>
+          </a:xfrm>
+          <a:prstGeom prst="roundRect">
+            <a:avLst/>
+          </a:prstGeom>
+          <a:solidFill>
+            <a:srgbClr val="DEEBF6"/>
+          </a:solidFill>
+          <a:ln cap="rnd">
+            <a:prstDash val="dashDot"/>
+            <a:round/>
+          </a:ln>
+          <a:effectLst>
+            <a:outerShdw blurRad="50800" dist="38100" dir="2700000" algn="tl" rotWithShape="0">
+              <a:prstClr val="black">
+                <a:alpha val="40000"/>
+              </a:prstClr>
+            </a:outerShdw>
+          </a:effectLst>
+        </p:spPr>
+        <p:style>
+          <a:lnRef idx="2">
+            <a:schemeClr val="accent1">
+              <a:shade val="50000"/>
+            </a:schemeClr>
+          </a:lnRef>
+          <a:fillRef idx="1">
+            <a:schemeClr val="accent1"/>
+          </a:fillRef>
+          <a:effectRef idx="0">
+            <a:schemeClr val="accent1"/>
+          </a:effectRef>
+          <a:fontRef idx="minor">
+            <a:schemeClr val="lt1"/>
+          </a:fontRef>
+        </p:style>
+        <p:txBody>
+          <a:bodyPr rtlCol="0" anchor="ctr"/>
+          <a:lstStyle/>
+          <a:p>
+            <a:pPr algn="ctr"/>
+            <a:r>
+              <a:rPr lang="en-US" dirty="0">
+                <a:solidFill>
+                  <a:schemeClr val="bg1">
+                    <a:lumMod val="65000"/>
+                  </a:schemeClr>
+                </a:solidFill>
+              </a:rPr>
+              <a:t>Organization</a:t>
+            </a:r>
+            <a:endParaRPr lang="en-AU" dirty="0">
+              <a:solidFill>
+                <a:schemeClr val="bg1">
+                  <a:lumMod val="65000"/>
+                </a:schemeClr>
+              </a:solidFill>
+            </a:endParaRPr>
+          </a:p>
+        </p:txBody>
+      </p:sp>
+      <p:sp>
+        <p:nvSpPr>
+          <p:cNvPr id="102" name="Rounded Rectangle 5"/>
+          <p:cNvSpPr/>
+          <p:nvPr/>
+        </p:nvSpPr>
+        <p:spPr>
+          <a:xfrm>
+            <a:off x="1277612" y="1305487"/>
+            <a:ext cx="1694439" cy="728495"/>
+          </a:xfrm>
+          <a:prstGeom prst="roundRect">
+            <a:avLst/>
+          </a:prstGeom>
+          <a:solidFill>
+            <a:srgbClr val="DEEBF6"/>
+          </a:solidFill>
+          <a:ln cap="rnd">
+            <a:prstDash val="dashDot"/>
+            <a:round/>
+          </a:ln>
+          <a:effectLst>
+            <a:outerShdw blurRad="50800" dist="38100" dir="2700000" algn="tl" rotWithShape="0">
+              <a:prstClr val="black">
+                <a:alpha val="40000"/>
+              </a:prstClr>
+            </a:outerShdw>
+          </a:effectLst>
+        </p:spPr>
+        <p:style>
+          <a:lnRef idx="2">
+            <a:schemeClr val="accent1">
+              <a:shade val="50000"/>
+            </a:schemeClr>
+          </a:lnRef>
+          <a:fillRef idx="1">
+            <a:schemeClr val="accent1"/>
+          </a:fillRef>
+          <a:effectRef idx="0">
+            <a:schemeClr val="accent1"/>
+          </a:effectRef>
+          <a:fontRef idx="minor">
+            <a:schemeClr val="lt1"/>
+          </a:fontRef>
+        </p:style>
+        <p:txBody>
+          <a:bodyPr rtlCol="0" anchor="ctr"/>
+          <a:lstStyle/>
+          <a:p>
+            <a:pPr algn="ctr"/>
+            <a:r>
+              <a:rPr lang="en-US" dirty="0">
+                <a:solidFill>
+                  <a:schemeClr val="bg1">
+                    <a:lumMod val="65000"/>
+                  </a:schemeClr>
+                </a:solidFill>
+              </a:rPr>
+              <a:t>Patient</a:t>
+            </a:r>
+            <a:endParaRPr lang="en-AU" dirty="0">
+              <a:solidFill>
+                <a:schemeClr val="bg1">
+                  <a:lumMod val="65000"/>
+                </a:schemeClr>
+              </a:solidFill>
+            </a:endParaRPr>
+          </a:p>
+        </p:txBody>
+      </p:sp>
+      <p:sp>
+        <p:nvSpPr>
+          <p:cNvPr id="103" name="Rounded Rectangle 5"/>
+          <p:cNvSpPr/>
+          <p:nvPr/>
+        </p:nvSpPr>
+        <p:spPr>
+          <a:xfrm>
+            <a:off x="3184069" y="1297134"/>
+            <a:ext cx="1694439" cy="728495"/>
+          </a:xfrm>
+          <a:prstGeom prst="roundRect">
+            <a:avLst/>
+          </a:prstGeom>
+          <a:solidFill>
+            <a:srgbClr val="DEEBF6"/>
+          </a:solidFill>
+          <a:ln cap="rnd">
+            <a:prstDash val="dashDot"/>
+            <a:round/>
+          </a:ln>
+          <a:effectLst>
+            <a:outerShdw blurRad="50800" dist="38100" dir="2700000" algn="tl" rotWithShape="0">
+              <a:prstClr val="black">
+                <a:alpha val="40000"/>
+              </a:prstClr>
+            </a:outerShdw>
+          </a:effectLst>
+        </p:spPr>
+        <p:style>
+          <a:lnRef idx="2">
+            <a:schemeClr val="accent1">
+              <a:shade val="50000"/>
+            </a:schemeClr>
+          </a:lnRef>
+          <a:fillRef idx="1">
+            <a:schemeClr val="accent1"/>
+          </a:fillRef>
+          <a:effectRef idx="0">
+            <a:schemeClr val="accent1"/>
+          </a:effectRef>
+          <a:fontRef idx="minor">
+            <a:schemeClr val="lt1"/>
+          </a:fontRef>
+        </p:style>
+        <p:txBody>
+          <a:bodyPr rtlCol="0" anchor="ctr"/>
+          <a:lstStyle/>
+          <a:p>
+            <a:pPr algn="ctr"/>
+            <a:r>
+              <a:rPr lang="en-US" dirty="0">
+                <a:solidFill>
+                  <a:schemeClr val="bg1">
+                    <a:lumMod val="65000"/>
+                  </a:schemeClr>
+                </a:solidFill>
+              </a:rPr>
+              <a:t>RelatedPerson</a:t>
+            </a:r>
+            <a:endParaRPr lang="en-AU" dirty="0">
+              <a:solidFill>
+                <a:schemeClr val="bg1">
+                  <a:lumMod val="65000"/>
+                </a:schemeClr>
+              </a:solidFill>
+            </a:endParaRPr>
+          </a:p>
+        </p:txBody>
+      </p:sp>
+      <p:sp>
+        <p:nvSpPr>
+          <p:cNvPr id="105" name="TextBox 104"/>
+          <p:cNvSpPr txBox="1"/>
+          <p:nvPr/>
+        </p:nvSpPr>
+        <p:spPr>
+          <a:xfrm>
+            <a:off x="3470054" y="2316231"/>
+            <a:ext cx="651717" cy="338554"/>
+          </a:xfrm>
+          <a:prstGeom prst="rect">
+            <a:avLst/>
+          </a:prstGeom>
+          <a:noFill/>
+        </p:spPr>
+        <p:txBody>
+          <a:bodyPr wrap="none" rtlCol="0">
+            <a:spAutoFit/>
+          </a:bodyPr>
+          <a:lstStyle/>
+          <a:p>
+            <a:r>
+              <a:rPr lang="en-US" sz="1600" dirty="0"/>
+              <a:t>Payor</a:t>
+            </a:r>
+          </a:p>
+        </p:txBody>
+      </p:sp>
+      <p:cxnSp>
+        <p:nvCxnSpPr>
+          <p:cNvPr id="107" name="Elbow Connector 37"/>
+          <p:cNvCxnSpPr>
+            <a:cxnSpLocks/>
+          </p:cNvCxnSpPr>
+          <p:nvPr/>
+        </p:nvCxnSpPr>
+        <p:spPr>
+          <a:xfrm>
+            <a:off x="2991484" y="3700439"/>
+            <a:ext cx="551183" cy="8455"/>
+          </a:xfrm>
+          <a:prstGeom prst="straightConnector1">
+            <a:avLst/>
+          </a:prstGeom>
+          <a:ln>
+            <a:tailEnd type="triangle"/>
+          </a:ln>
+        </p:spPr>
+        <p:style>
+          <a:lnRef idx="3">
+            <a:schemeClr val="dk1"/>
+          </a:lnRef>
+          <a:fillRef idx="0">
+            <a:schemeClr val="dk1"/>
+          </a:fillRef>
+          <a:effectRef idx="2">
+            <a:schemeClr val="dk1"/>
+          </a:effectRef>
+          <a:fontRef idx="minor">
+            <a:schemeClr val="tx1"/>
+          </a:fontRef>
+        </p:style>
+      </p:cxnSp>
+      <p:sp>
+        <p:nvSpPr>
+          <p:cNvPr id="108" name="Rounded Rectangle 6"/>
+          <p:cNvSpPr/>
+          <p:nvPr/>
+        </p:nvSpPr>
+        <p:spPr>
+          <a:xfrm>
+            <a:off x="3588452" y="3318142"/>
+            <a:ext cx="1192341" cy="728495"/>
+          </a:xfrm>
+          <a:prstGeom prst="roundRect">
+            <a:avLst/>
+          </a:prstGeom>
+          <a:solidFill>
+            <a:srgbClr val="CEE1F2"/>
+          </a:solidFill>
+          <a:ln cap="rnd">
+            <a:round/>
+          </a:ln>
+          <a:effectLst>
+            <a:outerShdw blurRad="50800" dist="38100" dir="2700000" algn="tl" rotWithShape="0">
+              <a:prstClr val="black">
+                <a:alpha val="40000"/>
+              </a:prstClr>
+            </a:outerShdw>
+          </a:effectLst>
+        </p:spPr>
+        <p:style>
+          <a:lnRef idx="2">
+            <a:schemeClr val="accent1">
+              <a:shade val="50000"/>
+            </a:schemeClr>
+          </a:lnRef>
+          <a:fillRef idx="1">
+            <a:schemeClr val="accent1"/>
+          </a:fillRef>
+          <a:effectRef idx="0">
+            <a:schemeClr val="accent1"/>
+          </a:effectRef>
+          <a:fontRef idx="minor">
+            <a:schemeClr val="lt1"/>
+          </a:fontRef>
+        </p:style>
+        <p:txBody>
+          <a:bodyPr rtlCol="0" anchor="ctr"/>
+          <a:lstStyle/>
+          <a:p>
+            <a:pPr algn="ctr"/>
+            <a:r>
+              <a:rPr lang="en-US" dirty="0">
+                <a:solidFill>
+                  <a:schemeClr val="tx1"/>
+                </a:solidFill>
+              </a:rPr>
+              <a:t>Coverage</a:t>
+            </a:r>
+          </a:p>
+        </p:txBody>
+      </p:sp>
+      <p:sp>
+        <p:nvSpPr>
+          <p:cNvPr id="109" name="Rounded Rectangle 6"/>
+          <p:cNvSpPr/>
+          <p:nvPr/>
+        </p:nvSpPr>
+        <p:spPr>
+          <a:xfrm>
+            <a:off x="1312891" y="3318142"/>
+            <a:ext cx="1694439" cy="728495"/>
+          </a:xfrm>
+          <a:prstGeom prst="roundRect">
+            <a:avLst/>
+          </a:prstGeom>
+          <a:solidFill>
+            <a:srgbClr val="DEEBF6"/>
+          </a:solidFill>
+          <a:ln cap="rnd">
+            <a:prstDash val="dashDot"/>
+            <a:round/>
+          </a:ln>
+          <a:effectLst>
+            <a:outerShdw blurRad="50800" dist="38100" dir="2700000" algn="tl" rotWithShape="0">
+              <a:prstClr val="black">
+                <a:alpha val="40000"/>
+              </a:prstClr>
+            </a:outerShdw>
+          </a:effectLst>
+        </p:spPr>
+        <p:style>
+          <a:lnRef idx="2">
+            <a:schemeClr val="accent1">
+              <a:shade val="50000"/>
+            </a:schemeClr>
+          </a:lnRef>
+          <a:fillRef idx="1">
+            <a:schemeClr val="accent1"/>
+          </a:fillRef>
+          <a:effectRef idx="0">
+            <a:schemeClr val="accent1"/>
+          </a:effectRef>
+          <a:fontRef idx="minor">
+            <a:schemeClr val="lt1"/>
+          </a:fontRef>
+        </p:style>
+        <p:txBody>
+          <a:bodyPr rtlCol="0" anchor="ctr"/>
+          <a:lstStyle/>
+          <a:p>
+            <a:pPr algn="ctr"/>
+            <a:r>
+              <a:rPr lang="en-US" dirty="0">
+                <a:solidFill>
+                  <a:schemeClr val="bg1">
+                    <a:lumMod val="65000"/>
+                  </a:schemeClr>
+                </a:solidFill>
+              </a:rPr>
+              <a:t>Account</a:t>
+            </a:r>
+          </a:p>
+        </p:txBody>
+      </p:sp>
+      <p:cxnSp>
+        <p:nvCxnSpPr>
+          <p:cNvPr id="113" name="Elbow Connector 37"/>
+          <p:cNvCxnSpPr/>
+          <p:nvPr/>
+        </p:nvCxnSpPr>
+        <p:spPr>
+          <a:xfrm flipV="1">
+            <a:off x="4887240" y="5306916"/>
+            <a:ext cx="401884" cy="480210"/>
+          </a:xfrm>
+          <a:prstGeom prst="straightConnector1">
+            <a:avLst/>
+          </a:prstGeom>
+          <a:ln>
+            <a:tailEnd type="triangle"/>
+          </a:ln>
+        </p:spPr>
+        <p:style>
+          <a:lnRef idx="3">
+            <a:schemeClr val="dk1"/>
+          </a:lnRef>
+          <a:fillRef idx="0">
+            <a:schemeClr val="dk1"/>
+          </a:fillRef>
+          <a:effectRef idx="2">
+            <a:schemeClr val="dk1"/>
+          </a:effectRef>
+          <a:fontRef idx="minor">
+            <a:schemeClr val="tx1"/>
+          </a:fontRef>
+        </p:style>
+      </p:cxnSp>
+      <p:sp>
+        <p:nvSpPr>
+          <p:cNvPr id="114" name="Rounded Rectangle 6"/>
+          <p:cNvSpPr/>
+          <p:nvPr/>
+        </p:nvSpPr>
+        <p:spPr>
+          <a:xfrm>
+            <a:off x="7027294" y="2536483"/>
+            <a:ext cx="2348200" cy="1196139"/>
+          </a:xfrm>
+          <a:prstGeom prst="roundRect">
+            <a:avLst/>
+          </a:prstGeom>
+          <a:solidFill>
+            <a:srgbClr val="DEEBF6"/>
+          </a:solidFill>
+          <a:ln cap="rnd">
+            <a:prstDash val="dashDot"/>
+            <a:round/>
+          </a:ln>
+          <a:effectLst>
+            <a:outerShdw blurRad="50800" dist="38100" dir="2700000" algn="tl" rotWithShape="0">
+              <a:prstClr val="black">
+                <a:alpha val="40000"/>
+              </a:prstClr>
+            </a:outerShdw>
+          </a:effectLst>
+        </p:spPr>
+        <p:style>
+          <a:lnRef idx="2">
+            <a:schemeClr val="accent1">
+              <a:shade val="50000"/>
+            </a:schemeClr>
+          </a:lnRef>
+          <a:fillRef idx="1">
+            <a:schemeClr val="accent1"/>
+          </a:fillRef>
+          <a:effectRef idx="0">
+            <a:schemeClr val="accent1"/>
+          </a:effectRef>
+          <a:fontRef idx="minor">
+            <a:schemeClr val="lt1"/>
+          </a:fontRef>
+        </p:style>
+        <p:txBody>
+          <a:bodyPr rtlCol="0" anchor="ctr"/>
+          <a:lstStyle/>
+          <a:p>
+            <a:pPr algn="ctr"/>
+            <a:r>
+              <a:rPr lang="en-US" dirty="0">
+                <a:solidFill>
+                  <a:schemeClr val="bg1">
+                    <a:lumMod val="65000"/>
+                  </a:schemeClr>
+                </a:solidFill>
+              </a:rPr>
+              <a:t>Prescription</a:t>
+            </a:r>
+            <a:br>
+              <a:rPr lang="en-US" dirty="0">
+                <a:solidFill>
+                  <a:schemeClr val="bg1">
+                    <a:lumMod val="65000"/>
+                  </a:schemeClr>
+                </a:solidFill>
+              </a:rPr>
+            </a:br>
+            <a:r>
+              <a:rPr lang="en-US" dirty="0">
+                <a:solidFill>
+                  <a:schemeClr val="bg1">
+                    <a:lumMod val="65000"/>
+                  </a:schemeClr>
+                </a:solidFill>
+              </a:rPr>
+              <a:t>(Medication Request / Device Request / Vision Prescription)</a:t>
+            </a:r>
+            <a:endParaRPr lang="en-AU" dirty="0">
+              <a:solidFill>
+                <a:schemeClr val="bg1">
+                  <a:lumMod val="65000"/>
+                </a:schemeClr>
+              </a:solidFill>
+            </a:endParaRPr>
+          </a:p>
+        </p:txBody>
+      </p:sp>
+      <p:sp>
+        <p:nvSpPr>
+          <p:cNvPr id="115" name="Rounded Rectangle 6"/>
+          <p:cNvSpPr/>
+          <p:nvPr/>
+        </p:nvSpPr>
+        <p:spPr>
+          <a:xfrm>
+            <a:off x="1297045" y="5671162"/>
+            <a:ext cx="1694439" cy="726034"/>
+          </a:xfrm>
+          <a:prstGeom prst="roundRect">
+            <a:avLst/>
+          </a:prstGeom>
+          <a:solidFill>
+            <a:srgbClr val="CEE1F2"/>
+          </a:solidFill>
+          <a:ln cap="rnd">
+            <a:round/>
+          </a:ln>
+          <a:effectLst>
+            <a:outerShdw blurRad="50800" dist="38100" dir="2700000" algn="tl" rotWithShape="0">
+              <a:prstClr val="black">
+                <a:alpha val="40000"/>
+              </a:prstClr>
+            </a:outerShdw>
+          </a:effectLst>
+        </p:spPr>
+        <p:style>
+          <a:lnRef idx="2">
+            <a:schemeClr val="accent1">
+              <a:shade val="50000"/>
+            </a:schemeClr>
+          </a:lnRef>
+          <a:fillRef idx="1">
+            <a:schemeClr val="accent1"/>
+          </a:fillRef>
+          <a:effectRef idx="0">
+            <a:schemeClr val="accent1"/>
+          </a:effectRef>
+          <a:fontRef idx="minor">
+            <a:schemeClr val="lt1"/>
+          </a:fontRef>
+        </p:style>
+        <p:txBody>
+          <a:bodyPr rtlCol="0" anchor="ctr"/>
+          <a:lstStyle/>
+          <a:p>
+            <a:pPr algn="ctr"/>
+            <a:r>
+              <a:rPr lang="en-US" dirty="0">
+                <a:solidFill>
+                  <a:schemeClr val="tx1"/>
+                </a:solidFill>
+              </a:rPr>
+              <a:t>Payment Reconciliation</a:t>
+            </a:r>
+            <a:endParaRPr lang="en-AU" dirty="0">
+              <a:solidFill>
+                <a:schemeClr val="tx1"/>
+              </a:solidFill>
+            </a:endParaRPr>
+          </a:p>
+        </p:txBody>
+      </p:sp>
+      <p:sp>
+        <p:nvSpPr>
+          <p:cNvPr id="116" name="Rounded Rectangle 6"/>
+          <p:cNvSpPr/>
+          <p:nvPr/>
+        </p:nvSpPr>
+        <p:spPr>
+          <a:xfrm>
+            <a:off x="7377529" y="4425301"/>
+            <a:ext cx="1610949" cy="728495"/>
+          </a:xfrm>
+          <a:prstGeom prst="roundRect">
+            <a:avLst/>
+          </a:prstGeom>
+          <a:solidFill>
+            <a:srgbClr val="DEEBF6"/>
+          </a:solidFill>
+          <a:ln cap="rnd">
+            <a:prstDash val="dashDot"/>
+            <a:round/>
+          </a:ln>
+          <a:effectLst>
+            <a:outerShdw blurRad="50800" dist="38100" dir="2700000" algn="tl" rotWithShape="0">
+              <a:prstClr val="black">
+                <a:alpha val="40000"/>
+              </a:prstClr>
+            </a:outerShdw>
+          </a:effectLst>
+        </p:spPr>
+        <p:style>
+          <a:lnRef idx="2">
+            <a:schemeClr val="accent1">
+              <a:shade val="50000"/>
+            </a:schemeClr>
+          </a:lnRef>
+          <a:fillRef idx="1">
+            <a:schemeClr val="accent1"/>
+          </a:fillRef>
+          <a:effectRef idx="0">
+            <a:schemeClr val="accent1"/>
+          </a:effectRef>
+          <a:fontRef idx="minor">
+            <a:schemeClr val="lt1"/>
+          </a:fontRef>
+        </p:style>
+        <p:txBody>
+          <a:bodyPr rtlCol="0" anchor="ctr"/>
+          <a:lstStyle/>
+          <a:p>
+            <a:pPr algn="ctr"/>
+            <a:r>
+              <a:rPr lang="en-US" dirty="0">
+                <a:solidFill>
+                  <a:schemeClr val="bg1">
+                    <a:lumMod val="65000"/>
+                  </a:schemeClr>
+                </a:solidFill>
+              </a:rPr>
+              <a:t>Service Request</a:t>
+            </a:r>
+            <a:endParaRPr lang="en-AU" dirty="0">
+              <a:solidFill>
+                <a:schemeClr val="bg1">
+                  <a:lumMod val="65000"/>
+                </a:schemeClr>
+              </a:solidFill>
+            </a:endParaRPr>
+          </a:p>
+        </p:txBody>
+      </p:sp>
+      <p:cxnSp>
+        <p:nvCxnSpPr>
+          <p:cNvPr id="117" name="Elbow Connector 37"/>
+          <p:cNvCxnSpPr/>
+          <p:nvPr/>
+        </p:nvCxnSpPr>
+        <p:spPr>
+          <a:xfrm flipV="1">
+            <a:off x="6489676" y="3855379"/>
+            <a:ext cx="747188" cy="737731"/>
+          </a:xfrm>
+          <a:prstGeom prst="straightConnector1">
+            <a:avLst/>
+          </a:prstGeom>
+          <a:ln>
+            <a:tailEnd type="triangle"/>
+          </a:ln>
+        </p:spPr>
+        <p:style>
+          <a:lnRef idx="3">
+            <a:schemeClr val="dk1"/>
+          </a:lnRef>
+          <a:fillRef idx="0">
+            <a:schemeClr val="dk1"/>
+          </a:fillRef>
+          <a:effectRef idx="2">
+            <a:schemeClr val="dk1"/>
+          </a:effectRef>
+          <a:fontRef idx="minor">
+            <a:schemeClr val="tx1"/>
+          </a:fontRef>
+        </p:style>
+      </p:cxnSp>
+      <p:sp>
+        <p:nvSpPr>
+          <p:cNvPr id="118" name="Rounded Rectangle 6"/>
+          <p:cNvSpPr/>
+          <p:nvPr/>
+        </p:nvSpPr>
+        <p:spPr>
+          <a:xfrm>
+            <a:off x="6074470" y="5700168"/>
+            <a:ext cx="1905649" cy="728495"/>
+          </a:xfrm>
+          <a:prstGeom prst="roundRect">
+            <a:avLst/>
+          </a:prstGeom>
+          <a:solidFill>
+            <a:srgbClr val="CEE1F2"/>
+          </a:solidFill>
+          <a:ln cap="rnd">
+            <a:round/>
+          </a:ln>
+          <a:effectLst>
+            <a:outerShdw blurRad="50800" dist="38100" dir="2700000" algn="tl" rotWithShape="0">
+              <a:prstClr val="black">
+                <a:alpha val="40000"/>
+              </a:prstClr>
+            </a:outerShdw>
+          </a:effectLst>
+        </p:spPr>
+        <p:style>
+          <a:lnRef idx="2">
+            <a:schemeClr val="accent1">
+              <a:shade val="50000"/>
+            </a:schemeClr>
+          </a:lnRef>
+          <a:fillRef idx="1">
+            <a:schemeClr val="accent1"/>
+          </a:fillRef>
+          <a:effectRef idx="0">
+            <a:schemeClr val="accent1"/>
+          </a:effectRef>
+          <a:fontRef idx="minor">
+            <a:schemeClr val="lt1"/>
+          </a:fontRef>
+        </p:style>
+        <p:txBody>
+          <a:bodyPr rtlCol="0" anchor="ctr"/>
+          <a:lstStyle/>
+          <a:p>
+            <a:pPr algn="ctr"/>
+            <a:r>
+              <a:rPr lang="en-US" dirty="0">
+                <a:solidFill>
+                  <a:schemeClr val="tx1"/>
+                </a:solidFill>
+              </a:rPr>
+              <a:t>Explanation Of Benefit</a:t>
+            </a:r>
+            <a:endParaRPr lang="en-AU" dirty="0">
+              <a:solidFill>
+                <a:schemeClr val="tx1"/>
+              </a:solidFill>
+            </a:endParaRPr>
+          </a:p>
+        </p:txBody>
+      </p:sp>
+      <p:sp>
+        <p:nvSpPr>
+          <p:cNvPr id="119" name="TextBox 118"/>
+          <p:cNvSpPr txBox="1"/>
+          <p:nvPr/>
+        </p:nvSpPr>
+        <p:spPr>
+          <a:xfrm>
+            <a:off x="6454483" y="3724710"/>
+            <a:ext cx="675698" cy="338554"/>
+          </a:xfrm>
+          <a:prstGeom prst="rect">
+            <a:avLst/>
+          </a:prstGeom>
+          <a:noFill/>
+        </p:spPr>
+        <p:txBody>
+          <a:bodyPr wrap="none" rtlCol="0">
+            <a:spAutoFit/>
+          </a:bodyPr>
+          <a:lstStyle/>
+          <a:p>
+            <a:r>
+              <a:rPr lang="en-US" sz="1600" dirty="0"/>
+              <a:t>Payee</a:t>
+            </a:r>
+          </a:p>
+        </p:txBody>
+      </p:sp>
+      <p:sp>
+        <p:nvSpPr>
+          <p:cNvPr id="120" name="Arc 119"/>
+          <p:cNvSpPr/>
+          <p:nvPr/>
+        </p:nvSpPr>
+        <p:spPr>
+          <a:xfrm flipH="1">
+            <a:off x="848447" y="2364860"/>
+            <a:ext cx="1061356" cy="2508599"/>
+          </a:xfrm>
+          <a:prstGeom prst="arc">
+            <a:avLst>
+              <a:gd name="adj1" fmla="val 16547918"/>
+              <a:gd name="adj2" fmla="val 5298157"/>
+            </a:avLst>
+          </a:prstGeom>
+          <a:ln w="12700">
+            <a:solidFill>
+              <a:schemeClr val="tx1"/>
+            </a:solidFill>
+            <a:headEnd type="triangle"/>
+          </a:ln>
+        </p:spPr>
+        <p:style>
+          <a:lnRef idx="1">
+            <a:schemeClr val="accent1"/>
+          </a:lnRef>
+          <a:fillRef idx="0">
+            <a:schemeClr val="accent1"/>
+          </a:fillRef>
+          <a:effectRef idx="0">
+            <a:schemeClr val="accent1"/>
+          </a:effectRef>
+          <a:fontRef idx="minor">
+            <a:schemeClr val="tx1"/>
+          </a:fontRef>
+        </p:style>
+        <p:txBody>
+          <a:bodyPr rtlCol="0" anchor="ctr"/>
+          <a:lstStyle/>
+          <a:p>
+            <a:pPr algn="ctr"/>
+            <a:endParaRPr lang="en-CA"/>
+          </a:p>
+        </p:txBody>
+      </p:sp>
+      <p:cxnSp>
+        <p:nvCxnSpPr>
+          <p:cNvPr id="121" name="Elbow Connector 37"/>
+          <p:cNvCxnSpPr/>
+          <p:nvPr/>
+        </p:nvCxnSpPr>
+        <p:spPr>
+          <a:xfrm flipH="1" flipV="1">
+            <a:off x="4786795" y="4080871"/>
+            <a:ext cx="200889" cy="463436"/>
+          </a:xfrm>
+          <a:prstGeom prst="straightConnector1">
+            <a:avLst/>
+          </a:prstGeom>
+          <a:ln>
+            <a:tailEnd type="triangle"/>
+          </a:ln>
+        </p:spPr>
+        <p:style>
+          <a:lnRef idx="3">
+            <a:schemeClr val="dk1"/>
+          </a:lnRef>
+          <a:fillRef idx="0">
+            <a:schemeClr val="dk1"/>
+          </a:fillRef>
+          <a:effectRef idx="2">
+            <a:schemeClr val="dk1"/>
+          </a:effectRef>
+          <a:fontRef idx="minor">
+            <a:schemeClr val="tx1"/>
+          </a:fontRef>
+        </p:style>
+      </p:cxnSp>
+      <p:sp>
+        <p:nvSpPr>
+          <p:cNvPr id="112" name="Rounded Rectangle 6"/>
+          <p:cNvSpPr/>
+          <p:nvPr/>
+        </p:nvSpPr>
+        <p:spPr>
+          <a:xfrm>
+            <a:off x="3746630" y="5671163"/>
+            <a:ext cx="1694439" cy="726034"/>
+          </a:xfrm>
+          <a:prstGeom prst="roundRect">
+            <a:avLst/>
+          </a:prstGeom>
+          <a:solidFill>
+            <a:srgbClr val="CEE1F2"/>
+          </a:solidFill>
+          <a:ln cap="rnd">
+            <a:round/>
+          </a:ln>
+          <a:effectLst>
+            <a:outerShdw blurRad="50800" dist="38100" dir="2700000" algn="tl" rotWithShape="0">
+              <a:prstClr val="black">
+                <a:alpha val="40000"/>
+              </a:prstClr>
+            </a:outerShdw>
+          </a:effectLst>
+        </p:spPr>
+        <p:style>
+          <a:lnRef idx="2">
+            <a:schemeClr val="accent1">
+              <a:shade val="50000"/>
+            </a:schemeClr>
+          </a:lnRef>
+          <a:fillRef idx="1">
+            <a:schemeClr val="accent1"/>
+          </a:fillRef>
+          <a:effectRef idx="0">
+            <a:schemeClr val="accent1"/>
+          </a:effectRef>
+          <a:fontRef idx="minor">
+            <a:schemeClr val="lt1"/>
+          </a:fontRef>
+        </p:style>
+        <p:txBody>
+          <a:bodyPr rtlCol="0" anchor="ctr"/>
+          <a:lstStyle/>
+          <a:p>
+            <a:pPr algn="ctr"/>
+            <a:r>
+              <a:rPr lang="en-US" dirty="0">
+                <a:solidFill>
+                  <a:schemeClr val="tx1"/>
+                </a:solidFill>
+              </a:rPr>
+              <a:t>Claim Response</a:t>
+            </a:r>
+          </a:p>
+        </p:txBody>
+      </p:sp>
+      <p:sp>
+        <p:nvSpPr>
+          <p:cNvPr id="104" name="Rounded Rectangle 6"/>
+          <p:cNvSpPr/>
+          <p:nvPr/>
+        </p:nvSpPr>
+        <p:spPr>
+          <a:xfrm>
+            <a:off x="4938971" y="4425302"/>
+            <a:ext cx="1694439" cy="728495"/>
+          </a:xfrm>
+          <a:prstGeom prst="roundRect">
+            <a:avLst/>
+          </a:prstGeom>
+          <a:solidFill>
+            <a:srgbClr val="CEE1F2"/>
+          </a:solidFill>
+          <a:ln cap="rnd">
+            <a:round/>
+          </a:ln>
+          <a:effectLst>
+            <a:outerShdw blurRad="50800" dist="38100" dir="2700000" algn="tl" rotWithShape="0">
+              <a:prstClr val="black">
+                <a:alpha val="40000"/>
+              </a:prstClr>
+            </a:outerShdw>
+          </a:effectLst>
+        </p:spPr>
+        <p:style>
+          <a:lnRef idx="2">
+            <a:schemeClr val="accent1">
+              <a:shade val="50000"/>
+            </a:schemeClr>
+          </a:lnRef>
+          <a:fillRef idx="1">
+            <a:schemeClr val="accent1"/>
+          </a:fillRef>
+          <a:effectRef idx="0">
+            <a:schemeClr val="accent1"/>
+          </a:effectRef>
+          <a:fontRef idx="minor">
+            <a:schemeClr val="lt1"/>
+          </a:fontRef>
+        </p:style>
+        <p:txBody>
+          <a:bodyPr rtlCol="0" anchor="ctr"/>
+          <a:lstStyle/>
+          <a:p>
+            <a:pPr algn="ctr"/>
+            <a:r>
+              <a:rPr lang="en-US" dirty="0">
+                <a:solidFill>
+                  <a:schemeClr val="tx1"/>
+                </a:solidFill>
+              </a:rPr>
+              <a:t>Claim</a:t>
+            </a:r>
+          </a:p>
+        </p:txBody>
+      </p:sp>
+      <p:sp>
+        <p:nvSpPr>
+          <p:cNvPr id="111" name="Rounded Rectangle 6"/>
+          <p:cNvSpPr/>
+          <p:nvPr/>
+        </p:nvSpPr>
+        <p:spPr>
+          <a:xfrm>
+            <a:off x="1312891" y="4509213"/>
+            <a:ext cx="1694439" cy="728495"/>
+          </a:xfrm>
+          <a:prstGeom prst="roundRect">
+            <a:avLst/>
+          </a:prstGeom>
+          <a:solidFill>
+            <a:srgbClr val="CEE1F2"/>
+          </a:solidFill>
+          <a:ln cap="rnd">
+            <a:round/>
+          </a:ln>
+          <a:effectLst>
+            <a:outerShdw blurRad="50800" dist="38100" dir="2700000" algn="tl" rotWithShape="0">
+              <a:prstClr val="black">
+                <a:alpha val="40000"/>
+              </a:prstClr>
+            </a:outerShdw>
+          </a:effectLst>
+        </p:spPr>
+        <p:style>
+          <a:lnRef idx="2">
+            <a:schemeClr val="accent1">
+              <a:shade val="50000"/>
+            </a:schemeClr>
+          </a:lnRef>
+          <a:fillRef idx="1">
+            <a:schemeClr val="accent1"/>
+          </a:fillRef>
+          <a:effectRef idx="0">
+            <a:schemeClr val="accent1"/>
+          </a:effectRef>
+          <a:fontRef idx="minor">
+            <a:schemeClr val="lt1"/>
+          </a:fontRef>
+        </p:style>
+        <p:txBody>
+          <a:bodyPr rtlCol="0" anchor="ctr"/>
+          <a:lstStyle/>
+          <a:p>
+            <a:pPr algn="ctr"/>
+            <a:r>
+              <a:rPr lang="en-US" dirty="0">
+                <a:solidFill>
+                  <a:schemeClr val="tx1"/>
+                </a:solidFill>
+              </a:rPr>
+              <a:t>Payment Notice</a:t>
+            </a:r>
+            <a:endParaRPr lang="en-AU" dirty="0">
+              <a:solidFill>
+                <a:schemeClr val="tx1"/>
+              </a:solidFill>
+            </a:endParaRPr>
+          </a:p>
+        </p:txBody>
+      </p:sp>
+      <p:sp>
+        <p:nvSpPr>
+          <p:cNvPr id="32" name="TextBox 31"/>
+          <p:cNvSpPr txBox="1"/>
+          <p:nvPr/>
+        </p:nvSpPr>
+        <p:spPr>
+          <a:xfrm>
+            <a:off x="3013503" y="2550715"/>
+            <a:ext cx="1113638" cy="830997"/>
+          </a:xfrm>
+          <a:prstGeom prst="rect">
+            <a:avLst/>
+          </a:prstGeom>
+          <a:noFill/>
+        </p:spPr>
+        <p:txBody>
+          <a:bodyPr wrap="none" rtlCol="0">
+            <a:spAutoFit/>
+          </a:bodyPr>
+          <a:lstStyle/>
+          <a:p>
+            <a:r>
+              <a:rPr lang="en-US" sz="1600" dirty="0"/>
+              <a:t>Beneficiary</a:t>
+            </a:r>
+          </a:p>
+          <a:p>
+            <a:r>
+              <a:rPr lang="en-US" sz="1600" dirty="0"/>
+              <a:t>Subscriber</a:t>
+            </a:r>
+          </a:p>
+          <a:p>
+            <a:r>
+              <a:rPr lang="en-US" sz="1600" dirty="0" err="1"/>
+              <a:t>PlanHolder</a:t>
+            </a:r>
+            <a:endParaRPr lang="en-US" sz="1600" dirty="0"/>
+          </a:p>
+        </p:txBody>
+      </p:sp>
+      <p:sp>
+        <p:nvSpPr>
+          <p:cNvPr id="34" name="Rounded Rectangle 9"/>
+          <p:cNvSpPr/>
+          <p:nvPr/>
+        </p:nvSpPr>
+        <p:spPr>
+          <a:xfrm>
+            <a:off x="3340021" y="4326834"/>
+            <a:ext cx="1083400" cy="728495"/>
+          </a:xfrm>
+          <a:prstGeom prst="roundRect">
+            <a:avLst/>
+          </a:prstGeom>
+          <a:solidFill>
+            <a:srgbClr val="DEEBF6"/>
+          </a:solidFill>
+          <a:ln cap="rnd">
+            <a:prstDash val="dashDot"/>
+            <a:round/>
+          </a:ln>
+          <a:effectLst>
+            <a:outerShdw blurRad="50800" dist="38100" dir="2700000" algn="tl" rotWithShape="0">
+              <a:prstClr val="black">
+                <a:alpha val="40000"/>
+              </a:prstClr>
+            </a:outerShdw>
+          </a:effectLst>
+        </p:spPr>
+        <p:style>
+          <a:lnRef idx="2">
+            <a:schemeClr val="accent1">
+              <a:shade val="50000"/>
+            </a:schemeClr>
+          </a:lnRef>
+          <a:fillRef idx="1">
+            <a:schemeClr val="accent1"/>
+          </a:fillRef>
+          <a:effectRef idx="0">
+            <a:schemeClr val="accent1"/>
+          </a:effectRef>
+          <a:fontRef idx="minor">
+            <a:schemeClr val="lt1"/>
+          </a:fontRef>
+        </p:style>
+        <p:txBody>
+          <a:bodyPr rtlCol="0" anchor="ctr"/>
+          <a:lstStyle/>
+          <a:p>
+            <a:pPr algn="ctr"/>
+            <a:r>
+              <a:rPr lang="en-US" dirty="0">
+                <a:solidFill>
+                  <a:schemeClr val="bg1">
+                    <a:lumMod val="65000"/>
+                  </a:schemeClr>
+                </a:solidFill>
+              </a:rPr>
+              <a:t>Charge Item</a:t>
+            </a:r>
+            <a:endParaRPr lang="en-AU" dirty="0">
+              <a:solidFill>
+                <a:schemeClr val="bg1">
+                  <a:lumMod val="65000"/>
+                </a:schemeClr>
+              </a:solidFill>
+            </a:endParaRPr>
+          </a:p>
+        </p:txBody>
+      </p:sp>
+      <p:cxnSp>
+        <p:nvCxnSpPr>
+          <p:cNvPr id="35" name="Elbow Connector 37"/>
+          <p:cNvCxnSpPr>
+            <a:cxnSpLocks/>
+          </p:cNvCxnSpPr>
+          <p:nvPr/>
+        </p:nvCxnSpPr>
+        <p:spPr>
+          <a:xfrm flipH="1" flipV="1">
+            <a:off x="3043755" y="4085842"/>
+            <a:ext cx="305994" cy="296549"/>
+          </a:xfrm>
+          <a:prstGeom prst="straightConnector1">
+            <a:avLst/>
+          </a:prstGeom>
+          <a:ln>
+            <a:tailEnd type="triangle"/>
+          </a:ln>
+        </p:spPr>
+        <p:style>
+          <a:lnRef idx="3">
+            <a:schemeClr val="dk1"/>
+          </a:lnRef>
+          <a:fillRef idx="0">
+            <a:schemeClr val="dk1"/>
+          </a:fillRef>
+          <a:effectRef idx="2">
+            <a:schemeClr val="dk1"/>
+          </a:effectRef>
+          <a:fontRef idx="minor">
+            <a:schemeClr val="tx1"/>
+          </a:fontRef>
+        </p:style>
+      </p:cxnSp>
+      <p:cxnSp>
+        <p:nvCxnSpPr>
+          <p:cNvPr id="8" name="Elbow Connector 37">
+            <a:extLst>
+              <a:ext uri="{FF2B5EF4-FFF2-40B4-BE49-F238E27FC236}">
+                <a16:creationId xmlns:a16="http://schemas.microsoft.com/office/drawing/2014/main" id="{9C494BE2-08BC-3DC0-AF89-41B3AACE5080}"/>
+              </a:ext>
+            </a:extLst>
+          </p:cNvPr>
+          <p:cNvCxnSpPr>
+            <a:cxnSpLocks/>
+          </p:cNvCxnSpPr>
+          <p:nvPr/>
+        </p:nvCxnSpPr>
+        <p:spPr>
+          <a:xfrm flipH="1" flipV="1">
+            <a:off x="6189671" y="2371309"/>
+            <a:ext cx="2528" cy="1092521"/>
+          </a:xfrm>
+          <a:prstGeom prst="straightConnector1">
+            <a:avLst/>
+          </a:prstGeom>
+          <a:ln>
+            <a:tailEnd type="triangle"/>
+          </a:ln>
+        </p:spPr>
+        <p:style>
+          <a:lnRef idx="3">
+            <a:schemeClr val="dk1"/>
+          </a:lnRef>
+          <a:fillRef idx="0">
+            <a:schemeClr val="dk1"/>
+          </a:fillRef>
+          <a:effectRef idx="2">
+            <a:schemeClr val="dk1"/>
+          </a:effectRef>
+          <a:fontRef idx="minor">
+            <a:schemeClr val="tx1"/>
+          </a:fontRef>
+        </p:style>
+      </p:cxnSp>
+      <p:sp>
+        <p:nvSpPr>
+          <p:cNvPr id="9" name="Rounded Rectangle 6">
+            <a:extLst>
+              <a:ext uri="{FF2B5EF4-FFF2-40B4-BE49-F238E27FC236}">
+                <a16:creationId xmlns:a16="http://schemas.microsoft.com/office/drawing/2014/main" id="{3F968F17-19E9-C4BB-4BA6-783BBA4A1944}"/>
+              </a:ext>
+            </a:extLst>
+          </p:cNvPr>
+          <p:cNvSpPr/>
+          <p:nvPr/>
+        </p:nvSpPr>
+        <p:spPr>
+          <a:xfrm>
+            <a:off x="5182775" y="3301208"/>
+            <a:ext cx="1192341" cy="728495"/>
+          </a:xfrm>
+          <a:prstGeom prst="roundRect">
+            <a:avLst/>
+          </a:prstGeom>
+          <a:solidFill>
+            <a:srgbClr val="CEE1F2"/>
+          </a:solidFill>
+          <a:ln cap="rnd">
+            <a:round/>
+          </a:ln>
+          <a:effectLst>
+            <a:outerShdw blurRad="50800" dist="38100" dir="2700000" algn="tl" rotWithShape="0">
+              <a:prstClr val="black">
+                <a:alpha val="40000"/>
+              </a:prstClr>
+            </a:outerShdw>
+          </a:effectLst>
+        </p:spPr>
+        <p:style>
+          <a:lnRef idx="2">
+            <a:schemeClr val="accent1">
+              <a:shade val="50000"/>
+            </a:schemeClr>
+          </a:lnRef>
+          <a:fillRef idx="1">
+            <a:schemeClr val="accent1"/>
+          </a:fillRef>
+          <a:effectRef idx="0">
+            <a:schemeClr val="accent1"/>
+          </a:effectRef>
+          <a:fontRef idx="minor">
+            <a:schemeClr val="lt1"/>
+          </a:fontRef>
+        </p:style>
+        <p:txBody>
+          <a:bodyPr rtlCol="0" anchor="ctr"/>
+          <a:lstStyle/>
+          <a:p>
+            <a:pPr algn="ctr"/>
+            <a:r>
+              <a:rPr lang="en-US" dirty="0">
+                <a:solidFill>
+                  <a:schemeClr val="tx1"/>
+                </a:solidFill>
+              </a:rPr>
+              <a:t>Contract</a:t>
+            </a:r>
+          </a:p>
+        </p:txBody>
+      </p:sp>
+      <p:cxnSp>
+        <p:nvCxnSpPr>
+          <p:cNvPr id="12" name="Elbow Connector 37">
+            <a:extLst>
+              <a:ext uri="{FF2B5EF4-FFF2-40B4-BE49-F238E27FC236}">
+                <a16:creationId xmlns:a16="http://schemas.microsoft.com/office/drawing/2014/main" id="{036AECDE-DC62-2EE4-65D3-5A8689755B6B}"/>
+              </a:ext>
+            </a:extLst>
+          </p:cNvPr>
+          <p:cNvCxnSpPr>
+            <a:cxnSpLocks/>
+          </p:cNvCxnSpPr>
+          <p:nvPr/>
+        </p:nvCxnSpPr>
+        <p:spPr>
+          <a:xfrm>
+            <a:off x="4780793" y="3695854"/>
+            <a:ext cx="322615" cy="0"/>
+          </a:xfrm>
+          <a:prstGeom prst="straightConnector1">
+            <a:avLst/>
+          </a:prstGeom>
+          <a:ln>
+            <a:tailEnd type="triangle"/>
+          </a:ln>
+        </p:spPr>
+        <p:style>
+          <a:lnRef idx="3">
+            <a:schemeClr val="dk1"/>
+          </a:lnRef>
+          <a:fillRef idx="0">
+            <a:schemeClr val="dk1"/>
+          </a:fillRef>
+          <a:effectRef idx="2">
+            <a:schemeClr val="dk1"/>
+          </a:effectRef>
+          <a:fontRef idx="minor">
+            <a:schemeClr val="tx1"/>
+          </a:fontRef>
+        </p:style>
+      </p:cxnSp>
+      <p:cxnSp>
+        <p:nvCxnSpPr>
+          <p:cNvPr id="3" name="Elbow Connector 37">
+            <a:extLst>
+              <a:ext uri="{FF2B5EF4-FFF2-40B4-BE49-F238E27FC236}">
+                <a16:creationId xmlns:a16="http://schemas.microsoft.com/office/drawing/2014/main" id="{F7F27085-67AD-6C7D-5BD3-E33D0A997BE9}"/>
+              </a:ext>
+            </a:extLst>
+          </p:cNvPr>
+          <p:cNvCxnSpPr>
+            <a:cxnSpLocks/>
+            <a:stCxn id="111" idx="2"/>
+          </p:cNvCxnSpPr>
+          <p:nvPr/>
+        </p:nvCxnSpPr>
+        <p:spPr>
+          <a:xfrm>
+            <a:off x="2160111" y="5237708"/>
+            <a:ext cx="7143" cy="352084"/>
+          </a:xfrm>
+          <a:prstGeom prst="straightConnector1">
+            <a:avLst/>
+          </a:prstGeom>
+          <a:ln>
+            <a:tailEnd type="triangle"/>
+          </a:ln>
+        </p:spPr>
+        <p:style>
+          <a:lnRef idx="3">
+            <a:schemeClr val="dk1"/>
+          </a:lnRef>
+          <a:fillRef idx="0">
+            <a:schemeClr val="dk1"/>
+          </a:fillRef>
+          <a:effectRef idx="2">
+            <a:schemeClr val="dk1"/>
+          </a:effectRef>
+          <a:fontRef idx="minor">
+            <a:schemeClr val="tx1"/>
+          </a:fontRef>
+        </p:style>
+      </p:cxnSp>
+      <p:sp>
+        <p:nvSpPr>
+          <p:cNvPr id="14" name="Rounded Rectangle 6">
+            <a:extLst>
+              <a:ext uri="{FF2B5EF4-FFF2-40B4-BE49-F238E27FC236}">
+                <a16:creationId xmlns:a16="http://schemas.microsoft.com/office/drawing/2014/main" id="{6A729E30-9E50-828C-D01B-CBB458072102}"/>
+              </a:ext>
+            </a:extLst>
+          </p:cNvPr>
+          <p:cNvSpPr/>
+          <p:nvPr/>
+        </p:nvSpPr>
+        <p:spPr>
+          <a:xfrm>
+            <a:off x="4817383" y="2430896"/>
+            <a:ext cx="1220437" cy="728495"/>
+          </a:xfrm>
+          <a:prstGeom prst="roundRect">
+            <a:avLst/>
+          </a:prstGeom>
+          <a:solidFill>
+            <a:srgbClr val="DEEBF6"/>
+          </a:solidFill>
+          <a:ln cap="rnd">
+            <a:prstDash val="dashDot"/>
+            <a:round/>
+          </a:ln>
+          <a:effectLst>
+            <a:outerShdw blurRad="50800" dist="38100" dir="2700000" algn="tl" rotWithShape="0">
+              <a:prstClr val="black">
+                <a:alpha val="40000"/>
+              </a:prstClr>
+            </a:outerShdw>
+          </a:effectLst>
+        </p:spPr>
+        <p:style>
+          <a:lnRef idx="2">
+            <a:schemeClr val="accent1">
+              <a:shade val="50000"/>
+            </a:schemeClr>
+          </a:lnRef>
+          <a:fillRef idx="1">
+            <a:schemeClr val="accent1"/>
+          </a:fillRef>
+          <a:effectRef idx="0">
+            <a:schemeClr val="accent1"/>
+          </a:effectRef>
+          <a:fontRef idx="minor">
+            <a:schemeClr val="lt1"/>
+          </a:fontRef>
+        </p:style>
+        <p:txBody>
+          <a:bodyPr rtlCol="0" anchor="ctr"/>
+          <a:lstStyle/>
+          <a:p>
+            <a:pPr algn="ctr"/>
+            <a:r>
+              <a:rPr lang="en-US" dirty="0">
+                <a:solidFill>
+                  <a:schemeClr val="bg1">
+                    <a:lumMod val="65000"/>
+                  </a:schemeClr>
+                </a:solidFill>
+              </a:rPr>
+              <a:t>Insurance Plan</a:t>
+            </a:r>
+            <a:endParaRPr lang="en-AU" dirty="0">
+              <a:solidFill>
+                <a:schemeClr val="bg1">
+                  <a:lumMod val="65000"/>
+                </a:schemeClr>
+              </a:solidFill>
+            </a:endParaRPr>
+          </a:p>
+        </p:txBody>
+      </p:sp>
+      <p:cxnSp>
+        <p:nvCxnSpPr>
+          <p:cNvPr id="15" name="Elbow Connector 37">
+            <a:extLst>
+              <a:ext uri="{FF2B5EF4-FFF2-40B4-BE49-F238E27FC236}">
+                <a16:creationId xmlns:a16="http://schemas.microsoft.com/office/drawing/2014/main" id="{B13191A0-0059-3138-0110-DB184F549197}"/>
+              </a:ext>
+            </a:extLst>
+          </p:cNvPr>
+          <p:cNvCxnSpPr>
+            <a:cxnSpLocks/>
+          </p:cNvCxnSpPr>
+          <p:nvPr/>
+        </p:nvCxnSpPr>
+        <p:spPr>
+          <a:xfrm flipV="1">
+            <a:off x="4515974" y="3110944"/>
+            <a:ext cx="235915" cy="207198"/>
+          </a:xfrm>
+          <a:prstGeom prst="straightConnector1">
+            <a:avLst/>
+          </a:prstGeom>
+          <a:ln>
+            <a:tailEnd type="triangle"/>
+          </a:ln>
+        </p:spPr>
+        <p:style>
+          <a:lnRef idx="3">
+            <a:schemeClr val="dk1"/>
+          </a:lnRef>
+          <a:fillRef idx="0">
+            <a:schemeClr val="dk1"/>
+          </a:fillRef>
+          <a:effectRef idx="2">
+            <a:schemeClr val="dk1"/>
+          </a:effectRef>
+          <a:fontRef idx="minor">
+            <a:schemeClr val="tx1"/>
+          </a:fontRef>
+        </p:style>
+      </p:cxnSp>
+    </p:spTree>
+    <p:extLst>
+      <p:ext uri="{BB962C8B-B14F-4D97-AF65-F5344CB8AC3E}">
+        <p14:creationId xmlns:p14="http://schemas.microsoft.com/office/powerpoint/2010/main" val="3090001346"/>
       </p:ext>
     </p:extLst>
   </p:cSld>

</xml_diff>